<commit_message>
updated plate editor slides
</commit_message>
<xml_diff>
--- a/docs/Presentations/Milestone1Presentation_v1.pptx
+++ b/docs/Presentations/Milestone1Presentation_v1.pptx
@@ -10,15 +10,19 @@
     <p:sldId id="266" r:id="rId4"/>
     <p:sldId id="267" r:id="rId5"/>
     <p:sldId id="258" r:id="rId6"/>
-    <p:sldId id="265" r:id="rId7"/>
-    <p:sldId id="268" r:id="rId8"/>
-    <p:sldId id="259" r:id="rId9"/>
-    <p:sldId id="260" r:id="rId10"/>
-    <p:sldId id="261" r:id="rId11"/>
-    <p:sldId id="264" r:id="rId12"/>
-    <p:sldId id="269" r:id="rId13"/>
-    <p:sldId id="262" r:id="rId14"/>
-    <p:sldId id="263" r:id="rId15"/>
+    <p:sldId id="273" r:id="rId7"/>
+    <p:sldId id="270" r:id="rId8"/>
+    <p:sldId id="272" r:id="rId9"/>
+    <p:sldId id="275" r:id="rId10"/>
+    <p:sldId id="265" r:id="rId11"/>
+    <p:sldId id="268" r:id="rId12"/>
+    <p:sldId id="259" r:id="rId13"/>
+    <p:sldId id="260" r:id="rId14"/>
+    <p:sldId id="261" r:id="rId15"/>
+    <p:sldId id="264" r:id="rId16"/>
+    <p:sldId id="269" r:id="rId17"/>
+    <p:sldId id="262" r:id="rId18"/>
+    <p:sldId id="263" r:id="rId19"/>
   </p:sldIdLst>
   <p:sldSz cx="9144000" cy="6858000" type="screen4x3"/>
   <p:notesSz cx="6858000" cy="9144000"/>
@@ -308,7 +312,7 @@
           <a:p>
             <a:fld id="{C8A432C8-69A7-458B-9684-2BFA64B31948}" type="datetime2">
               <a:rPr lang="en-US" smtClean="0"/>
-              <a:t>Wednesday, March 4, 15</a:t>
+              <a:t>Thursday, March 05, 2015</a:t>
             </a:fld>
             <a:endParaRPr lang="en-US" dirty="0"/>
           </a:p>
@@ -510,7 +514,7 @@
           <a:p>
             <a:fld id="{8CC057FC-95B6-4D89-AFDA-ABA33EE921E5}" type="datetime2">
               <a:rPr lang="en-US" smtClean="0"/>
-              <a:t>Wednesday, March 4, 15</a:t>
+              <a:t>Thursday, March 05, 2015</a:t>
             </a:fld>
             <a:endParaRPr lang="en-US" dirty="0"/>
           </a:p>
@@ -687,7 +691,7 @@
           <a:p>
             <a:fld id="{EC4549AC-EB31-477F-92A9-B1988E232878}" type="datetime2">
               <a:rPr lang="en-US" smtClean="0"/>
-              <a:t>Wednesday, March 4, 15</a:t>
+              <a:t>Thursday, March 05, 2015</a:t>
             </a:fld>
             <a:endParaRPr lang="en-US" dirty="0"/>
           </a:p>
@@ -854,7 +858,7 @@
           <a:p>
             <a:fld id="{6396A3A3-94A6-4E5B-AF39-173ACA3E61CC}" type="datetime2">
               <a:rPr lang="en-US" smtClean="0"/>
-              <a:t>Wednesday, March 4, 15</a:t>
+              <a:t>Thursday, March 05, 2015</a:t>
             </a:fld>
             <a:endParaRPr lang="en-US" dirty="0"/>
           </a:p>
@@ -1104,7 +1108,7 @@
           <a:p>
             <a:fld id="{9933D019-A32C-4EAD-B8E6-DBDA699692FD}" type="datetime2">
               <a:rPr lang="en-US" smtClean="0"/>
-              <a:t>Wednesday, March 4, 15</a:t>
+              <a:t>Thursday, March 05, 2015</a:t>
             </a:fld>
             <a:endParaRPr lang="en-US" dirty="0"/>
           </a:p>
@@ -1424,7 +1428,7 @@
           <a:p>
             <a:fld id="{CCEBA98F-560C-4997-81C4-81D4D9187EAB}" type="datetime2">
               <a:rPr lang="en-US" smtClean="0"/>
-              <a:t>Wednesday, March 4, 15</a:t>
+              <a:t>Thursday, March 05, 2015</a:t>
             </a:fld>
             <a:endParaRPr lang="en-US" dirty="0"/>
           </a:p>
@@ -1892,7 +1896,7 @@
           <a:p>
             <a:fld id="{150972B2-CA5C-437D-87D0-8081271A9E4B}" type="datetime2">
               <a:rPr lang="en-US" smtClean="0"/>
-              <a:t>Wednesday, March 4, 15</a:t>
+              <a:t>Thursday, March 05, 2015</a:t>
             </a:fld>
             <a:endParaRPr lang="en-US" dirty="0"/>
           </a:p>
@@ -2042,7 +2046,7 @@
           <a:p>
             <a:fld id="{79CD4847-11EF-4466-A8AD-85CDB7B49118}" type="datetime2">
               <a:rPr lang="en-US" smtClean="0"/>
-              <a:t>Wednesday, March 4, 15</a:t>
+              <a:t>Thursday, March 05, 2015</a:t>
             </a:fld>
             <a:endParaRPr lang="en-US" dirty="0"/>
           </a:p>
@@ -2134,7 +2138,7 @@
           <a:p>
             <a:fld id="{F168457A-3AB9-4880-8A0C-9F8524491207}" type="datetime2">
               <a:rPr lang="en-US" smtClean="0"/>
-              <a:t>Wednesday, March 4, 15</a:t>
+              <a:t>Thursday, March 05, 2015</a:t>
             </a:fld>
             <a:endParaRPr lang="en-US" dirty="0"/>
           </a:p>
@@ -2410,7 +2414,7 @@
           <a:p>
             <a:fld id="{3FE976D3-5B7F-4300-ABED-C91F1B2AE209}" type="datetime2">
               <a:rPr lang="en-US" smtClean="0"/>
-              <a:t>Wednesday, March 4, 15</a:t>
+              <a:t>Thursday, March 05, 2015</a:t>
             </a:fld>
             <a:endParaRPr lang="en-US" dirty="0"/>
           </a:p>
@@ -2717,7 +2721,7 @@
           <a:p>
             <a:fld id="{EBDC1E59-17DD-41CE-97CA-624A472382D4}" type="datetime2">
               <a:rPr lang="en-US" smtClean="0"/>
-              <a:t>Wednesday, March 4, 15</a:t>
+              <a:t>Thursday, March 05, 2015</a:t>
             </a:fld>
             <a:endParaRPr lang="en-US" dirty="0"/>
           </a:p>
@@ -3017,7 +3021,7 @@
           <a:p>
             <a:fld id="{A80CB818-7379-467D-8E76-EF9D9074A26C}" type="datetime2">
               <a:rPr lang="en-US" smtClean="0"/>
-              <a:t>Wednesday, March 4, 15</a:t>
+              <a:t>Thursday, March 05, 2015</a:t>
             </a:fld>
             <a:endParaRPr lang="en-US" dirty="0"/>
           </a:p>
@@ -3426,7 +3430,7 @@
           <p:nvPr/>
         </p:nvPicPr>
         <p:blipFill>
-          <a:blip r:embed="rId2" cstate="print">
+          <a:blip r:embed="rId2" cstate="email">
             <a:extLst>
               <a:ext uri="{28A0092B-C50C-407E-A947-70E740481C1C}">
                 <a14:useLocalDpi xmlns:a14="http://schemas.microsoft.com/office/drawing/2010/main" val="0"/>
@@ -3616,7 +3620,7 @@
           <p:nvPr/>
         </p:nvPicPr>
         <p:blipFill>
-          <a:blip r:embed="rId3">
+          <a:blip r:embed="rId3" cstate="email">
             <a:extLst>
               <a:ext uri="{28A0092B-C50C-407E-A947-70E740481C1C}">
                 <a14:useLocalDpi xmlns:a14="http://schemas.microsoft.com/office/drawing/2010/main" val="0"/>
@@ -3688,1225 +3692,17 @@
   <p:clrMapOvr>
     <a:masterClrMapping/>
   </p:clrMapOvr>
+  <p:timing>
+    <p:tnLst>
+      <p:par>
+        <p:cTn id="1" dur="indefinite" restart="never" nodeType="tmRoot"/>
+      </p:par>
+    </p:tnLst>
+  </p:timing>
 </p:sld>
 </file>
 
 <file path=ppt/slides/slide10.xml><?xml version="1.0" encoding="utf-8"?>
-<p:sld xmlns:a="http://schemas.openxmlformats.org/drawingml/2006/main" xmlns:r="http://schemas.openxmlformats.org/officeDocument/2006/relationships" xmlns:p="http://schemas.openxmlformats.org/presentationml/2006/main">
-  <p:cSld>
-    <p:spTree>
-      <p:nvGrpSpPr>
-        <p:cNvPr id="1" name=""/>
-        <p:cNvGrpSpPr/>
-        <p:nvPr/>
-      </p:nvGrpSpPr>
-      <p:grpSpPr>
-        <a:xfrm>
-          <a:off x="0" y="0"/>
-          <a:ext cx="0" cy="0"/>
-          <a:chOff x="0" y="0"/>
-          <a:chExt cx="0" cy="0"/>
-        </a:xfrm>
-      </p:grpSpPr>
-      <p:sp>
-        <p:nvSpPr>
-          <p:cNvPr id="2" name="Title 1"/>
-          <p:cNvSpPr>
-            <a:spLocks noGrp="1"/>
-          </p:cNvSpPr>
-          <p:nvPr>
-            <p:ph type="title"/>
-          </p:nvPr>
-        </p:nvSpPr>
-        <p:spPr/>
-        <p:txBody>
-          <a:bodyPr/>
-          <a:lstStyle/>
-          <a:p>
-            <a:r>
-              <a:rPr lang="en-US" dirty="0" smtClean="0"/>
-              <a:t>Front End</a:t>
-            </a:r>
-            <a:endParaRPr lang="en-US" dirty="0"/>
-          </a:p>
-        </p:txBody>
-      </p:sp>
-      <p:sp>
-        <p:nvSpPr>
-          <p:cNvPr id="3" name="Content Placeholder 2"/>
-          <p:cNvSpPr>
-            <a:spLocks noGrp="1"/>
-          </p:cNvSpPr>
-          <p:nvPr>
-            <p:ph idx="1"/>
-          </p:nvPr>
-        </p:nvSpPr>
-        <p:spPr/>
-        <p:txBody>
-          <a:bodyPr/>
-          <a:lstStyle/>
-          <a:p>
-            <a:endParaRPr lang="en-US" dirty="0"/>
-          </a:p>
-        </p:txBody>
-      </p:sp>
-    </p:spTree>
-    <p:extLst>
-      <p:ext uri="{BB962C8B-B14F-4D97-AF65-F5344CB8AC3E}">
-        <p14:creationId xmlns:p14="http://schemas.microsoft.com/office/powerpoint/2010/main" val="831731777"/>
-      </p:ext>
-    </p:extLst>
-  </p:cSld>
-  <p:clrMapOvr>
-    <a:masterClrMapping/>
-  </p:clrMapOvr>
-</p:sld>
-</file>
-
-<file path=ppt/slides/slide11.xml><?xml version="1.0" encoding="utf-8"?>
-<p:sld xmlns:a="http://schemas.openxmlformats.org/drawingml/2006/main" xmlns:r="http://schemas.openxmlformats.org/officeDocument/2006/relationships" xmlns:p="http://schemas.openxmlformats.org/presentationml/2006/main">
-  <p:cSld>
-    <p:spTree>
-      <p:nvGrpSpPr>
-        <p:cNvPr id="1" name=""/>
-        <p:cNvGrpSpPr/>
-        <p:nvPr/>
-      </p:nvGrpSpPr>
-      <p:grpSpPr>
-        <a:xfrm>
-          <a:off x="0" y="0"/>
-          <a:ext cx="0" cy="0"/>
-          <a:chOff x="0" y="0"/>
-          <a:chExt cx="0" cy="0"/>
-        </a:xfrm>
-      </p:grpSpPr>
-      <p:sp>
-        <p:nvSpPr>
-          <p:cNvPr id="2" name="Title 1"/>
-          <p:cNvSpPr>
-            <a:spLocks noGrp="1"/>
-          </p:cNvSpPr>
-          <p:nvPr>
-            <p:ph type="title"/>
-          </p:nvPr>
-        </p:nvSpPr>
-        <p:spPr/>
-        <p:txBody>
-          <a:bodyPr/>
-          <a:lstStyle/>
-          <a:p>
-            <a:r>
-              <a:rPr lang="en-US" dirty="0" smtClean="0"/>
-              <a:t>Project Risks</a:t>
-            </a:r>
-            <a:endParaRPr lang="en-US" dirty="0"/>
-          </a:p>
-        </p:txBody>
-      </p:sp>
-      <p:sp>
-        <p:nvSpPr>
-          <p:cNvPr id="3" name="Content Placeholder 2"/>
-          <p:cNvSpPr>
-            <a:spLocks noGrp="1"/>
-          </p:cNvSpPr>
-          <p:nvPr>
-            <p:ph idx="1"/>
-          </p:nvPr>
-        </p:nvSpPr>
-        <p:spPr/>
-        <p:txBody>
-          <a:bodyPr>
-            <a:normAutofit fontScale="92500" lnSpcReduction="10000"/>
-          </a:bodyPr>
-          <a:lstStyle/>
-          <a:p>
-            <a:pPr marL="0" indent="0">
-              <a:buNone/>
-            </a:pPr>
-            <a:r>
-              <a:rPr lang="en-US" dirty="0" smtClean="0"/>
-              <a:t>Risks</a:t>
-            </a:r>
-          </a:p>
-          <a:p>
-            <a:pPr lvl="1"/>
-            <a:r>
-              <a:rPr lang="en-US" dirty="0" smtClean="0"/>
-              <a:t>Integration with other teams</a:t>
-            </a:r>
-          </a:p>
-          <a:p>
-            <a:pPr lvl="2"/>
-            <a:r>
-              <a:rPr lang="en-US" dirty="0" smtClean="0"/>
-              <a:t>Design meetings with other teams planned</a:t>
-            </a:r>
-          </a:p>
-          <a:p>
-            <a:pPr lvl="1"/>
-            <a:endParaRPr lang="en-US" dirty="0" smtClean="0"/>
-          </a:p>
-          <a:p>
-            <a:pPr lvl="1"/>
-            <a:r>
-              <a:rPr lang="en-US" dirty="0" smtClean="0"/>
-              <a:t>Stories take longer that estimated</a:t>
-            </a:r>
-          </a:p>
-          <a:p>
-            <a:pPr lvl="2"/>
-            <a:r>
-              <a:rPr lang="en-US" dirty="0" smtClean="0"/>
-              <a:t>Keep a burn-up chart and prioritize stories</a:t>
-            </a:r>
-          </a:p>
-          <a:p>
-            <a:pPr lvl="1"/>
-            <a:endParaRPr lang="en-US" dirty="0" smtClean="0"/>
-          </a:p>
-          <a:p>
-            <a:pPr lvl="1"/>
-            <a:r>
-              <a:rPr lang="en-US" dirty="0" smtClean="0"/>
-              <a:t>Getting of Good Test Data</a:t>
-            </a:r>
-          </a:p>
-          <a:p>
-            <a:pPr lvl="2"/>
-            <a:r>
-              <a:rPr lang="en-US" dirty="0" smtClean="0"/>
-              <a:t>Professor and TA may be able to get more</a:t>
-            </a:r>
-          </a:p>
-          <a:p>
-            <a:endParaRPr lang="en-US" dirty="0" smtClean="0"/>
-          </a:p>
-          <a:p>
-            <a:r>
-              <a:rPr lang="en-US" dirty="0" smtClean="0"/>
-              <a:t>Testing Strategy</a:t>
-            </a:r>
-          </a:p>
-          <a:p>
-            <a:pPr lvl="1"/>
-            <a:r>
-              <a:rPr lang="en-US" dirty="0" smtClean="0"/>
-              <a:t>Test Driven Design</a:t>
-            </a:r>
-          </a:p>
-          <a:p>
-            <a:pPr lvl="1"/>
-            <a:r>
-              <a:rPr lang="en-US" dirty="0" smtClean="0"/>
-              <a:t>Joint</a:t>
-            </a:r>
-          </a:p>
-          <a:p>
-            <a:pPr lvl="1"/>
-            <a:r>
-              <a:rPr lang="en-US" dirty="0" smtClean="0"/>
-              <a:t>Frontend TBD</a:t>
-            </a:r>
-            <a:endParaRPr lang="en-US" dirty="0" smtClean="0"/>
-          </a:p>
-        </p:txBody>
-      </p:sp>
-    </p:spTree>
-    <p:extLst>
-      <p:ext uri="{BB962C8B-B14F-4D97-AF65-F5344CB8AC3E}">
-        <p14:creationId xmlns:p14="http://schemas.microsoft.com/office/powerpoint/2010/main" val="4258234684"/>
-      </p:ext>
-    </p:extLst>
-  </p:cSld>
-  <p:clrMapOvr>
-    <a:masterClrMapping/>
-  </p:clrMapOvr>
-</p:sld>
-</file>
-
-<file path=ppt/slides/slide12.xml><?xml version="1.0" encoding="utf-8"?>
-<p:sld xmlns:a="http://schemas.openxmlformats.org/drawingml/2006/main" xmlns:r="http://schemas.openxmlformats.org/officeDocument/2006/relationships" xmlns:p="http://schemas.openxmlformats.org/presentationml/2006/main">
-  <p:cSld>
-    <p:spTree>
-      <p:nvGrpSpPr>
-        <p:cNvPr id="1" name=""/>
-        <p:cNvGrpSpPr/>
-        <p:nvPr/>
-      </p:nvGrpSpPr>
-      <p:grpSpPr>
-        <a:xfrm>
-          <a:off x="0" y="0"/>
-          <a:ext cx="0" cy="0"/>
-          <a:chOff x="0" y="0"/>
-          <a:chExt cx="0" cy="0"/>
-        </a:xfrm>
-      </p:grpSpPr>
-      <p:sp>
-        <p:nvSpPr>
-          <p:cNvPr id="2" name="Title 1"/>
-          <p:cNvSpPr>
-            <a:spLocks noGrp="1"/>
-          </p:cNvSpPr>
-          <p:nvPr>
-            <p:ph type="title"/>
-          </p:nvPr>
-        </p:nvSpPr>
-        <p:spPr/>
-        <p:txBody>
-          <a:bodyPr/>
-          <a:lstStyle/>
-          <a:p>
-            <a:r>
-              <a:rPr lang="en-US" dirty="0" smtClean="0"/>
-              <a:t>Project </a:t>
-            </a:r>
-            <a:r>
-              <a:rPr lang="en-US" dirty="0" smtClean="0"/>
-              <a:t>Planning – Team / Tools</a:t>
-            </a:r>
-            <a:endParaRPr lang="en-US" dirty="0"/>
-          </a:p>
-        </p:txBody>
-      </p:sp>
-      <p:sp>
-        <p:nvSpPr>
-          <p:cNvPr id="3" name="Content Placeholder 2"/>
-          <p:cNvSpPr>
-            <a:spLocks noGrp="1"/>
-          </p:cNvSpPr>
-          <p:nvPr>
-            <p:ph idx="1"/>
-          </p:nvPr>
-        </p:nvSpPr>
-        <p:spPr/>
-        <p:txBody>
-          <a:bodyPr/>
-          <a:lstStyle/>
-          <a:p>
-            <a:pPr marL="0" indent="0">
-              <a:buNone/>
-            </a:pPr>
-            <a:r>
-              <a:rPr lang="en-US" dirty="0" smtClean="0"/>
-              <a:t>Division of Labor</a:t>
-            </a:r>
-          </a:p>
-          <a:p>
-            <a:pPr lvl="1"/>
-            <a:r>
-              <a:rPr lang="en-US" dirty="0" smtClean="0"/>
-              <a:t>3 People specializing in Front End work</a:t>
-            </a:r>
-          </a:p>
-          <a:p>
-            <a:pPr lvl="1"/>
-            <a:r>
-              <a:rPr lang="en-US" dirty="0" smtClean="0"/>
-              <a:t>2 People specializing in Back End work</a:t>
-            </a:r>
-          </a:p>
-          <a:p>
-            <a:pPr lvl="1"/>
-            <a:endParaRPr lang="en-US" dirty="0" smtClean="0"/>
-          </a:p>
-          <a:p>
-            <a:pPr lvl="1"/>
-            <a:endParaRPr lang="en-US" dirty="0" smtClean="0"/>
-          </a:p>
-          <a:p>
-            <a:pPr marL="0" indent="0">
-              <a:buNone/>
-            </a:pPr>
-            <a:r>
-              <a:rPr lang="en-US" dirty="0" smtClean="0"/>
-              <a:t>Collaborative Tools</a:t>
-            </a:r>
-          </a:p>
-          <a:p>
-            <a:pPr lvl="1"/>
-            <a:r>
-              <a:rPr lang="en-US" dirty="0" smtClean="0"/>
-              <a:t>Slack (messaging)</a:t>
-            </a:r>
-          </a:p>
-          <a:p>
-            <a:pPr lvl="1"/>
-            <a:r>
-              <a:rPr lang="en-US" dirty="0" smtClean="0"/>
-              <a:t>Git</a:t>
-            </a:r>
-            <a:r>
-              <a:rPr lang="en-US" dirty="0" smtClean="0"/>
-              <a:t> Hub Repository</a:t>
-            </a:r>
-          </a:p>
-          <a:p>
-            <a:pPr lvl="1"/>
-            <a:r>
-              <a:rPr lang="en-US" dirty="0" smtClean="0"/>
-              <a:t>JIRA</a:t>
-            </a:r>
-            <a:endParaRPr lang="en-US" dirty="0" smtClean="0"/>
-          </a:p>
-          <a:p>
-            <a:endParaRPr lang="en-US" dirty="0" smtClean="0"/>
-          </a:p>
-        </p:txBody>
-      </p:sp>
-    </p:spTree>
-    <p:extLst>
-      <p:ext uri="{BB962C8B-B14F-4D97-AF65-F5344CB8AC3E}">
-        <p14:creationId xmlns:p14="http://schemas.microsoft.com/office/powerpoint/2010/main" val="1096911352"/>
-      </p:ext>
-    </p:extLst>
-  </p:cSld>
-  <p:clrMapOvr>
-    <a:masterClrMapping/>
-  </p:clrMapOvr>
-</p:sld>
-</file>
-
-<file path=ppt/slides/slide13.xml><?xml version="1.0" encoding="utf-8"?>
-<p:sld xmlns:a="http://schemas.openxmlformats.org/drawingml/2006/main" xmlns:r="http://schemas.openxmlformats.org/officeDocument/2006/relationships" xmlns:p="http://schemas.openxmlformats.org/presentationml/2006/main">
-  <p:cSld>
-    <p:spTree>
-      <p:nvGrpSpPr>
-        <p:cNvPr id="1" name=""/>
-        <p:cNvGrpSpPr/>
-        <p:nvPr/>
-      </p:nvGrpSpPr>
-      <p:grpSpPr>
-        <a:xfrm>
-          <a:off x="0" y="0"/>
-          <a:ext cx="0" cy="0"/>
-          <a:chOff x="0" y="0"/>
-          <a:chExt cx="0" cy="0"/>
-        </a:xfrm>
-      </p:grpSpPr>
-      <p:sp>
-        <p:nvSpPr>
-          <p:cNvPr id="2" name="Title 1"/>
-          <p:cNvSpPr>
-            <a:spLocks noGrp="1"/>
-          </p:cNvSpPr>
-          <p:nvPr>
-            <p:ph type="title"/>
-          </p:nvPr>
-        </p:nvSpPr>
-        <p:spPr/>
-        <p:txBody>
-          <a:bodyPr/>
-          <a:lstStyle/>
-          <a:p>
-            <a:r>
-              <a:rPr lang="en-US" dirty="0" smtClean="0"/>
-              <a:t>Project Planning</a:t>
-            </a:r>
-            <a:endParaRPr lang="en-US" dirty="0"/>
-          </a:p>
-        </p:txBody>
-      </p:sp>
-      <p:sp>
-        <p:nvSpPr>
-          <p:cNvPr id="3" name="Content Placeholder 2"/>
-          <p:cNvSpPr>
-            <a:spLocks noGrp="1"/>
-          </p:cNvSpPr>
-          <p:nvPr>
-            <p:ph idx="1"/>
-          </p:nvPr>
-        </p:nvSpPr>
-        <p:spPr/>
-        <p:txBody>
-          <a:bodyPr/>
-          <a:lstStyle/>
-          <a:p>
-            <a:r>
-              <a:rPr lang="en-US" dirty="0" smtClean="0"/>
-              <a:t>10 Iterations</a:t>
-            </a:r>
-            <a:endParaRPr lang="en-US" dirty="0" smtClean="0"/>
-          </a:p>
-          <a:p>
-            <a:r>
-              <a:rPr lang="en-US" dirty="0" smtClean="0"/>
-              <a:t>360 Story Points (Project Estimate 720 Hours)</a:t>
-            </a:r>
-          </a:p>
-          <a:p>
-            <a:r>
-              <a:rPr lang="en-US" dirty="0" smtClean="0"/>
-              <a:t>Burn-up Calculated weekly</a:t>
-            </a:r>
-            <a:endParaRPr lang="en-US" dirty="0" smtClean="0"/>
-          </a:p>
-          <a:p>
-            <a:endParaRPr lang="en-US" dirty="0" smtClean="0"/>
-          </a:p>
-        </p:txBody>
-      </p:sp>
-      <p:pic>
-        <p:nvPicPr>
-          <p:cNvPr id="4" name="Picture 3" descr="BurnUpChart.png"/>
-          <p:cNvPicPr>
-            <a:picLocks noChangeAspect="1"/>
-          </p:cNvPicPr>
-          <p:nvPr/>
-        </p:nvPicPr>
-        <p:blipFill>
-          <a:blip r:embed="rId2">
-            <a:extLst>
-              <a:ext uri="{28A0092B-C50C-407E-A947-70E740481C1C}">
-                <a14:useLocalDpi xmlns:a14="http://schemas.microsoft.com/office/drawing/2010/main" val="0"/>
-              </a:ext>
-            </a:extLst>
-          </a:blip>
-          <a:stretch>
-            <a:fillRect/>
-          </a:stretch>
-        </p:blipFill>
-        <p:spPr>
-          <a:xfrm>
-            <a:off x="1701800" y="3225800"/>
-            <a:ext cx="5504688" cy="2761488"/>
-          </a:xfrm>
-          <a:prstGeom prst="rect">
-            <a:avLst/>
-          </a:prstGeom>
-        </p:spPr>
-      </p:pic>
-    </p:spTree>
-    <p:extLst>
-      <p:ext uri="{BB962C8B-B14F-4D97-AF65-F5344CB8AC3E}">
-        <p14:creationId xmlns:p14="http://schemas.microsoft.com/office/powerpoint/2010/main" val="3210332075"/>
-      </p:ext>
-    </p:extLst>
-  </p:cSld>
-  <p:clrMapOvr>
-    <a:masterClrMapping/>
-  </p:clrMapOvr>
-</p:sld>
-</file>
-
-<file path=ppt/slides/slide14.xml><?xml version="1.0" encoding="utf-8"?>
-<p:sld xmlns:a="http://schemas.openxmlformats.org/drawingml/2006/main" xmlns:r="http://schemas.openxmlformats.org/officeDocument/2006/relationships" xmlns:p="http://schemas.openxmlformats.org/presentationml/2006/main">
-  <p:cSld>
-    <p:spTree>
-      <p:nvGrpSpPr>
-        <p:cNvPr id="1" name=""/>
-        <p:cNvGrpSpPr/>
-        <p:nvPr/>
-      </p:nvGrpSpPr>
-      <p:grpSpPr>
-        <a:xfrm>
-          <a:off x="0" y="0"/>
-          <a:ext cx="0" cy="0"/>
-          <a:chOff x="0" y="0"/>
-          <a:chExt cx="0" cy="0"/>
-        </a:xfrm>
-      </p:grpSpPr>
-      <p:sp>
-        <p:nvSpPr>
-          <p:cNvPr id="2" name="Title 1"/>
-          <p:cNvSpPr>
-            <a:spLocks noGrp="1"/>
-          </p:cNvSpPr>
-          <p:nvPr>
-            <p:ph type="title"/>
-          </p:nvPr>
-        </p:nvSpPr>
-        <p:spPr/>
-        <p:txBody>
-          <a:bodyPr/>
-          <a:lstStyle/>
-          <a:p>
-            <a:r>
-              <a:rPr lang="en-US" dirty="0" smtClean="0"/>
-              <a:t>Key Milestones</a:t>
-            </a:r>
-            <a:endParaRPr lang="en-US" dirty="0"/>
-          </a:p>
-        </p:txBody>
-      </p:sp>
-      <p:sp>
-        <p:nvSpPr>
-          <p:cNvPr id="3" name="Content Placeholder 2"/>
-          <p:cNvSpPr>
-            <a:spLocks noGrp="1"/>
-          </p:cNvSpPr>
-          <p:nvPr>
-            <p:ph idx="1"/>
-          </p:nvPr>
-        </p:nvSpPr>
-        <p:spPr/>
-        <p:txBody>
-          <a:bodyPr>
-            <a:normAutofit fontScale="92500" lnSpcReduction="10000"/>
-          </a:bodyPr>
-          <a:lstStyle/>
-          <a:p>
-            <a:r>
-              <a:rPr lang="en-US" dirty="0" smtClean="0"/>
-              <a:t>Milestone 2 </a:t>
-            </a:r>
-            <a:r>
-              <a:rPr lang="en-US" dirty="0" smtClean="0"/>
-              <a:t>Deliverables</a:t>
-            </a:r>
-          </a:p>
-          <a:p>
-            <a:pPr lvl="1"/>
-            <a:r>
-              <a:rPr lang="en-US" dirty="0" smtClean="0"/>
-              <a:t>Screen </a:t>
-            </a:r>
-            <a:r>
-              <a:rPr lang="en-US" dirty="0" smtClean="0"/>
-              <a:t>Process Flow</a:t>
-            </a:r>
-          </a:p>
-          <a:p>
-            <a:pPr lvl="1"/>
-            <a:r>
-              <a:rPr lang="en-US" dirty="0" smtClean="0"/>
-              <a:t>Domain Model</a:t>
-            </a:r>
-            <a:endParaRPr lang="en-US" dirty="0" smtClean="0"/>
-          </a:p>
-          <a:p>
-            <a:pPr lvl="1"/>
-            <a:r>
-              <a:rPr lang="en-US" dirty="0" smtClean="0"/>
-              <a:t>Web Service Interfaces</a:t>
-            </a:r>
-          </a:p>
-          <a:p>
-            <a:pPr lvl="1"/>
-            <a:r>
-              <a:rPr lang="en-US" dirty="0" smtClean="0"/>
-              <a:t>Plate Map Editor</a:t>
-            </a:r>
-          </a:p>
-          <a:p>
-            <a:pPr lvl="1"/>
-            <a:r>
-              <a:rPr lang="en-US" dirty="0" smtClean="0"/>
-              <a:t>Web Services for Plate Editor</a:t>
-            </a:r>
-          </a:p>
-          <a:p>
-            <a:pPr lvl="1"/>
-            <a:r>
-              <a:rPr lang="en-US" dirty="0" smtClean="0"/>
-              <a:t>Web Services for QC Results</a:t>
-            </a:r>
-          </a:p>
-          <a:p>
-            <a:pPr lvl="1"/>
-            <a:r>
-              <a:rPr lang="en-US" dirty="0" smtClean="0"/>
-              <a:t>Heat Maps </a:t>
-            </a:r>
-          </a:p>
-          <a:p>
-            <a:pPr lvl="1"/>
-            <a:r>
-              <a:rPr lang="en-US" dirty="0" smtClean="0"/>
-              <a:t>QC Plates / Experiments </a:t>
-            </a:r>
-          </a:p>
-          <a:p>
-            <a:pPr lvl="1"/>
-            <a:endParaRPr lang="en-US" dirty="0" smtClean="0"/>
-          </a:p>
-          <a:p>
-            <a:r>
-              <a:rPr lang="en-US" dirty="0" smtClean="0"/>
-              <a:t>Milestone 3 </a:t>
-            </a:r>
-            <a:r>
-              <a:rPr lang="en-US" dirty="0" smtClean="0"/>
-              <a:t>Deliverables</a:t>
-            </a:r>
-          </a:p>
-          <a:p>
-            <a:pPr lvl="1"/>
-            <a:r>
-              <a:rPr lang="en-US" dirty="0" smtClean="0"/>
-              <a:t>Interactive Analysis</a:t>
-            </a:r>
-            <a:endParaRPr lang="en-US" dirty="0" smtClean="0"/>
-          </a:p>
-          <a:p>
-            <a:pPr lvl="1"/>
-            <a:r>
-              <a:rPr lang="en-US" dirty="0" smtClean="0"/>
-              <a:t>Interactive Dose Response Analysis</a:t>
-            </a:r>
-          </a:p>
-          <a:p>
-            <a:pPr lvl="1"/>
-            <a:r>
-              <a:rPr lang="en-US" dirty="0" smtClean="0"/>
-              <a:t>Save or Publish</a:t>
-            </a:r>
-            <a:endParaRPr lang="en-US" dirty="0"/>
-          </a:p>
-        </p:txBody>
-      </p:sp>
-    </p:spTree>
-    <p:extLst>
-      <p:ext uri="{BB962C8B-B14F-4D97-AF65-F5344CB8AC3E}">
-        <p14:creationId xmlns:p14="http://schemas.microsoft.com/office/powerpoint/2010/main" val="1815632258"/>
-      </p:ext>
-    </p:extLst>
-  </p:cSld>
-  <p:clrMapOvr>
-    <a:masterClrMapping/>
-  </p:clrMapOvr>
-</p:sld>
-</file>
-
-<file path=ppt/slides/slide2.xml><?xml version="1.0" encoding="utf-8"?>
-<p:sld xmlns:a="http://schemas.openxmlformats.org/drawingml/2006/main" xmlns:r="http://schemas.openxmlformats.org/officeDocument/2006/relationships" xmlns:p="http://schemas.openxmlformats.org/presentationml/2006/main">
-  <p:cSld>
-    <p:spTree>
-      <p:nvGrpSpPr>
-        <p:cNvPr id="1" name=""/>
-        <p:cNvGrpSpPr/>
-        <p:nvPr/>
-      </p:nvGrpSpPr>
-      <p:grpSpPr>
-        <a:xfrm>
-          <a:off x="0" y="0"/>
-          <a:ext cx="0" cy="0"/>
-          <a:chOff x="0" y="0"/>
-          <a:chExt cx="0" cy="0"/>
-        </a:xfrm>
-      </p:grpSpPr>
-      <p:sp>
-        <p:nvSpPr>
-          <p:cNvPr id="2" name="Title 1"/>
-          <p:cNvSpPr>
-            <a:spLocks noGrp="1"/>
-          </p:cNvSpPr>
-          <p:nvPr>
-            <p:ph type="title"/>
-          </p:nvPr>
-        </p:nvSpPr>
-        <p:spPr/>
-        <p:txBody>
-          <a:bodyPr/>
-          <a:lstStyle/>
-          <a:p>
-            <a:r>
-              <a:rPr lang="en-US" dirty="0" smtClean="0"/>
-              <a:t>WE99 Team Vision</a:t>
-            </a:r>
-            <a:endParaRPr lang="en-US" dirty="0"/>
-          </a:p>
-        </p:txBody>
-      </p:sp>
-      <p:sp>
-        <p:nvSpPr>
-          <p:cNvPr id="3" name="Content Placeholder 2"/>
-          <p:cNvSpPr>
-            <a:spLocks noGrp="1"/>
-          </p:cNvSpPr>
-          <p:nvPr>
-            <p:ph idx="1"/>
-          </p:nvPr>
-        </p:nvSpPr>
-        <p:spPr/>
-        <p:txBody>
-          <a:bodyPr>
-            <a:normAutofit fontScale="70000" lnSpcReduction="20000"/>
-          </a:bodyPr>
-          <a:lstStyle/>
-          <a:p>
-            <a:pPr marL="0" indent="0" algn="ctr">
-              <a:buNone/>
-            </a:pPr>
-            <a:r>
-              <a:rPr lang="en-US" dirty="0" smtClean="0"/>
-              <a:t>The </a:t>
-            </a:r>
-            <a:r>
-              <a:rPr lang="en-US" dirty="0"/>
-              <a:t>team focus is providing outstanding tools to assist in analyzing the dose response characteristics potential drugs.</a:t>
-            </a:r>
-          </a:p>
-          <a:p>
-            <a:pPr marL="0" indent="0" algn="ctr">
-              <a:buNone/>
-            </a:pPr>
-            <a:r>
-              <a:rPr lang="en-US" dirty="0"/>
-              <a:t> </a:t>
-            </a:r>
-          </a:p>
-          <a:p>
-            <a:pPr marL="0" indent="0" algn="ctr">
-              <a:buNone/>
-            </a:pPr>
-            <a:r>
-              <a:rPr lang="en-US" dirty="0"/>
-              <a:t>We will provide beautiful interactive visualization tools that will assist the scientist in:</a:t>
-            </a:r>
-          </a:p>
-          <a:p>
-            <a:pPr marL="0" indent="0" algn="ctr">
-              <a:buNone/>
-            </a:pPr>
-            <a:r>
-              <a:rPr lang="en-US" dirty="0"/>
-              <a:t> </a:t>
-            </a:r>
-          </a:p>
-          <a:p>
-            <a:pPr lvl="0"/>
-            <a:r>
-              <a:rPr lang="en-US" dirty="0"/>
-              <a:t>Creating and managing experimental plate sets for dose response experiments</a:t>
-            </a:r>
-          </a:p>
-          <a:p>
-            <a:pPr lvl="0"/>
-            <a:r>
-              <a:rPr lang="en-US" dirty="0"/>
-              <a:t>Performing quality control checks on plate results and plate controls</a:t>
-            </a:r>
-          </a:p>
-          <a:p>
-            <a:pPr lvl="0"/>
-            <a:r>
-              <a:rPr lang="en-US" dirty="0"/>
-              <a:t>Performing Interactive analysis of dose response results.</a:t>
-            </a:r>
-          </a:p>
-          <a:p>
-            <a:pPr marL="0" indent="0" algn="ctr">
-              <a:buNone/>
-            </a:pPr>
-            <a:r>
-              <a:rPr lang="en-US" dirty="0"/>
-              <a:t> </a:t>
-            </a:r>
-          </a:p>
-          <a:p>
-            <a:pPr marL="0" indent="0" algn="ctr">
-              <a:buNone/>
-            </a:pPr>
-            <a:r>
-              <a:rPr lang="en-US" dirty="0"/>
-              <a:t> </a:t>
-            </a:r>
-          </a:p>
-          <a:p>
-            <a:pPr marL="0" indent="0" algn="ctr">
-              <a:buNone/>
-            </a:pPr>
-            <a:r>
-              <a:rPr lang="en-US" dirty="0"/>
-              <a:t>The team will store the experimental results and the analysis of the results so that the historic experimental analysis can be reviewed or reproduced at any time.</a:t>
-            </a:r>
-          </a:p>
-          <a:p>
-            <a:pPr marL="0" indent="0" algn="ctr">
-              <a:buNone/>
-            </a:pPr>
-            <a:r>
-              <a:rPr lang="en-US" dirty="0"/>
-              <a:t> </a:t>
-            </a:r>
-          </a:p>
-          <a:p>
-            <a:pPr marL="0" indent="0" algn="ctr">
-              <a:buNone/>
-            </a:pPr>
-            <a:r>
-              <a:rPr lang="en-US" dirty="0"/>
-              <a:t>Scientists will be able to save the results for further analysis or publish their analysis, making it available to all other users.</a:t>
-            </a:r>
-          </a:p>
-          <a:p>
-            <a:pPr marL="0" indent="0">
-              <a:buNone/>
-            </a:pPr>
-            <a:endParaRPr lang="en-US" dirty="0"/>
-          </a:p>
-        </p:txBody>
-      </p:sp>
-    </p:spTree>
-    <p:extLst>
-      <p:ext uri="{BB962C8B-B14F-4D97-AF65-F5344CB8AC3E}">
-        <p14:creationId xmlns:p14="http://schemas.microsoft.com/office/powerpoint/2010/main" val="994059251"/>
-      </p:ext>
-    </p:extLst>
-  </p:cSld>
-  <p:clrMapOvr>
-    <a:masterClrMapping/>
-  </p:clrMapOvr>
-</p:sld>
-</file>
-
-<file path=ppt/slides/slide3.xml><?xml version="1.0" encoding="utf-8"?>
-<p:sld xmlns:a="http://schemas.openxmlformats.org/drawingml/2006/main" xmlns:r="http://schemas.openxmlformats.org/officeDocument/2006/relationships" xmlns:p="http://schemas.openxmlformats.org/presentationml/2006/main">
-  <p:cSld>
-    <p:spTree>
-      <p:nvGrpSpPr>
-        <p:cNvPr id="1" name=""/>
-        <p:cNvGrpSpPr/>
-        <p:nvPr/>
-      </p:nvGrpSpPr>
-      <p:grpSpPr>
-        <a:xfrm>
-          <a:off x="0" y="0"/>
-          <a:ext cx="0" cy="0"/>
-          <a:chOff x="0" y="0"/>
-          <a:chExt cx="0" cy="0"/>
-        </a:xfrm>
-      </p:grpSpPr>
-      <p:sp>
-        <p:nvSpPr>
-          <p:cNvPr id="2" name="Title 1"/>
-          <p:cNvSpPr>
-            <a:spLocks noGrp="1"/>
-          </p:cNvSpPr>
-          <p:nvPr>
-            <p:ph type="title"/>
-          </p:nvPr>
-        </p:nvSpPr>
-        <p:spPr/>
-        <p:txBody>
-          <a:bodyPr/>
-          <a:lstStyle/>
-          <a:p>
-            <a:r>
-              <a:rPr lang="en-US" dirty="0" smtClean="0"/>
-              <a:t>Business Opportunity</a:t>
-            </a:r>
-            <a:endParaRPr lang="en-US" dirty="0"/>
-          </a:p>
-        </p:txBody>
-      </p:sp>
-      <p:sp>
-        <p:nvSpPr>
-          <p:cNvPr id="3" name="Content Placeholder 2"/>
-          <p:cNvSpPr>
-            <a:spLocks noGrp="1"/>
-          </p:cNvSpPr>
-          <p:nvPr>
-            <p:ph idx="1"/>
-          </p:nvPr>
-        </p:nvSpPr>
-        <p:spPr/>
-        <p:txBody>
-          <a:bodyPr>
-            <a:normAutofit lnSpcReduction="10000"/>
-          </a:bodyPr>
-          <a:lstStyle/>
-          <a:p>
-            <a:r>
-              <a:rPr lang="en-US" dirty="0" smtClean="0"/>
-              <a:t>High </a:t>
-            </a:r>
-            <a:r>
-              <a:rPr lang="en-US" dirty="0"/>
-              <a:t>throughput screening </a:t>
-            </a:r>
-            <a:r>
-              <a:rPr lang="en-US" dirty="0" smtClean="0"/>
-              <a:t>tests </a:t>
-            </a:r>
-            <a:r>
-              <a:rPr lang="en-US" dirty="0"/>
-              <a:t>millions of potential drugs</a:t>
-            </a:r>
-            <a:r>
-              <a:rPr lang="en-US" dirty="0" smtClean="0"/>
-              <a:t>.</a:t>
-            </a:r>
-          </a:p>
-          <a:p>
-            <a:endParaRPr lang="en-US" dirty="0" smtClean="0"/>
-          </a:p>
-          <a:p>
-            <a:r>
-              <a:rPr lang="en-US" dirty="0" smtClean="0"/>
-              <a:t>Commercial software is expensive</a:t>
-            </a:r>
-          </a:p>
-          <a:p>
-            <a:endParaRPr lang="en-US" dirty="0" smtClean="0"/>
-          </a:p>
-          <a:p>
-            <a:r>
-              <a:rPr lang="en-US" dirty="0" smtClean="0"/>
-              <a:t>E</a:t>
-            </a:r>
-            <a:r>
-              <a:rPr lang="en-US" dirty="0" smtClean="0"/>
-              <a:t>nable Scientists to be </a:t>
-            </a:r>
-            <a:r>
-              <a:rPr lang="en-US" dirty="0"/>
-              <a:t>organized and efficient when screening </a:t>
-            </a:r>
-            <a:r>
-              <a:rPr lang="en-US" dirty="0" smtClean="0"/>
-              <a:t>potential </a:t>
-            </a:r>
-            <a:r>
-              <a:rPr lang="en-US" dirty="0"/>
-              <a:t>drugs. </a:t>
-            </a:r>
-            <a:endParaRPr lang="en-US" dirty="0" smtClean="0"/>
-          </a:p>
-          <a:p>
-            <a:endParaRPr lang="en-US" dirty="0"/>
-          </a:p>
-          <a:p>
-            <a:r>
-              <a:rPr lang="en-US" dirty="0" smtClean="0"/>
-              <a:t>Dynamic analysis tools help reduce the number of experiments.</a:t>
-            </a:r>
-          </a:p>
-          <a:p>
-            <a:endParaRPr lang="en-US" dirty="0" smtClean="0"/>
-          </a:p>
-          <a:p>
-            <a:r>
-              <a:rPr lang="en-US" dirty="0" smtClean="0"/>
-              <a:t>Eliminate </a:t>
-            </a:r>
-            <a:r>
-              <a:rPr lang="en-US" dirty="0"/>
-              <a:t>compounds earlier in the discovery </a:t>
-            </a:r>
-            <a:r>
-              <a:rPr lang="en-US" dirty="0" smtClean="0"/>
-              <a:t>cycle.</a:t>
-            </a:r>
-            <a:endParaRPr lang="en-US" dirty="0"/>
-          </a:p>
-        </p:txBody>
-      </p:sp>
-    </p:spTree>
-    <p:extLst>
-      <p:ext uri="{BB962C8B-B14F-4D97-AF65-F5344CB8AC3E}">
-        <p14:creationId xmlns:p14="http://schemas.microsoft.com/office/powerpoint/2010/main" val="2700570494"/>
-      </p:ext>
-    </p:extLst>
-  </p:cSld>
-  <p:clrMapOvr>
-    <a:masterClrMapping/>
-  </p:clrMapOvr>
-</p:sld>
-</file>
-
-<file path=ppt/slides/slide4.xml><?xml version="1.0" encoding="utf-8"?>
-<p:sld xmlns:a="http://schemas.openxmlformats.org/drawingml/2006/main" xmlns:r="http://schemas.openxmlformats.org/officeDocument/2006/relationships" xmlns:p="http://schemas.openxmlformats.org/presentationml/2006/main">
-  <p:cSld>
-    <p:spTree>
-      <p:nvGrpSpPr>
-        <p:cNvPr id="1" name=""/>
-        <p:cNvGrpSpPr/>
-        <p:nvPr/>
-      </p:nvGrpSpPr>
-      <p:grpSpPr>
-        <a:xfrm>
-          <a:off x="0" y="0"/>
-          <a:ext cx="0" cy="0"/>
-          <a:chOff x="0" y="0"/>
-          <a:chExt cx="0" cy="0"/>
-        </a:xfrm>
-      </p:grpSpPr>
-      <p:sp>
-        <p:nvSpPr>
-          <p:cNvPr id="2" name="Title 1"/>
-          <p:cNvSpPr>
-            <a:spLocks noGrp="1"/>
-          </p:cNvSpPr>
-          <p:nvPr>
-            <p:ph type="title"/>
-          </p:nvPr>
-        </p:nvSpPr>
-        <p:spPr/>
-        <p:txBody>
-          <a:bodyPr/>
-          <a:lstStyle/>
-          <a:p>
-            <a:r>
-              <a:rPr lang="en-US" dirty="0" smtClean="0"/>
-              <a:t>Presentation Outline</a:t>
-            </a:r>
-            <a:endParaRPr lang="en-US" dirty="0"/>
-          </a:p>
-        </p:txBody>
-      </p:sp>
-      <p:sp>
-        <p:nvSpPr>
-          <p:cNvPr id="3" name="Content Placeholder 2"/>
-          <p:cNvSpPr>
-            <a:spLocks noGrp="1"/>
-          </p:cNvSpPr>
-          <p:nvPr>
-            <p:ph idx="1"/>
-          </p:nvPr>
-        </p:nvSpPr>
-        <p:spPr/>
-        <p:txBody>
-          <a:bodyPr/>
-          <a:lstStyle/>
-          <a:p>
-            <a:pPr marL="0" indent="0">
-              <a:buNone/>
-            </a:pPr>
-            <a:r>
-              <a:rPr lang="en-US" dirty="0" smtClean="0"/>
-              <a:t>Overvie</a:t>
-            </a:r>
-            <a:r>
-              <a:rPr lang="en-US" dirty="0" smtClean="0"/>
-              <a:t>w of Presentation</a:t>
-            </a:r>
-            <a:endParaRPr lang="en-US" dirty="0" smtClean="0"/>
-          </a:p>
-          <a:p>
-            <a:pPr marL="0" indent="0">
-              <a:buNone/>
-            </a:pPr>
-            <a:endParaRPr lang="en-US" dirty="0" smtClean="0"/>
-          </a:p>
-          <a:p>
-            <a:r>
-              <a:rPr lang="en-US" dirty="0" smtClean="0"/>
-              <a:t>Plate Editing and Creation – Alex</a:t>
-            </a:r>
-          </a:p>
-          <a:p>
-            <a:r>
-              <a:rPr lang="en-US" dirty="0" smtClean="0"/>
-              <a:t>Results Analysis – Sean</a:t>
-            </a:r>
-          </a:p>
-          <a:p>
-            <a:r>
-              <a:rPr lang="en-US" dirty="0" smtClean="0"/>
-              <a:t>Architecture – Mark</a:t>
-            </a:r>
-          </a:p>
-          <a:p>
-            <a:r>
-              <a:rPr lang="en-US" dirty="0" smtClean="0"/>
-              <a:t>Front End –</a:t>
-            </a:r>
-            <a:r>
-              <a:rPr lang="en-US" dirty="0"/>
-              <a:t> </a:t>
-            </a:r>
-            <a:r>
-              <a:rPr lang="en-US" dirty="0" smtClean="0"/>
-              <a:t>Tim</a:t>
-            </a:r>
-          </a:p>
-          <a:p>
-            <a:r>
-              <a:rPr lang="en-US" dirty="0" smtClean="0"/>
-              <a:t>Project Planning/Estimates - Alan</a:t>
-            </a:r>
-          </a:p>
-        </p:txBody>
-      </p:sp>
-    </p:spTree>
-    <p:extLst>
-      <p:ext uri="{BB962C8B-B14F-4D97-AF65-F5344CB8AC3E}">
-        <p14:creationId xmlns:p14="http://schemas.microsoft.com/office/powerpoint/2010/main" val="187400791"/>
-      </p:ext>
-    </p:extLst>
-  </p:cSld>
-  <p:clrMapOvr>
-    <a:masterClrMapping/>
-  </p:clrMapOvr>
-</p:sld>
-</file>
-
-<file path=ppt/slides/slide5.xml><?xml version="1.0" encoding="utf-8"?>
-<p:sld xmlns:a="http://schemas.openxmlformats.org/drawingml/2006/main" xmlns:r="http://schemas.openxmlformats.org/officeDocument/2006/relationships" xmlns:p="http://schemas.openxmlformats.org/presentationml/2006/main">
-  <p:cSld>
-    <p:spTree>
-      <p:nvGrpSpPr>
-        <p:cNvPr id="1" name=""/>
-        <p:cNvGrpSpPr/>
-        <p:nvPr/>
-      </p:nvGrpSpPr>
-      <p:grpSpPr>
-        <a:xfrm>
-          <a:off x="0" y="0"/>
-          <a:ext cx="0" cy="0"/>
-          <a:chOff x="0" y="0"/>
-          <a:chExt cx="0" cy="0"/>
-        </a:xfrm>
-      </p:grpSpPr>
-      <p:sp>
-        <p:nvSpPr>
-          <p:cNvPr id="2" name="Title 1"/>
-          <p:cNvSpPr>
-            <a:spLocks noGrp="1"/>
-          </p:cNvSpPr>
-          <p:nvPr>
-            <p:ph type="title"/>
-          </p:nvPr>
-        </p:nvSpPr>
-        <p:spPr/>
-        <p:txBody>
-          <a:bodyPr>
-            <a:normAutofit/>
-          </a:bodyPr>
-          <a:lstStyle/>
-          <a:p>
-            <a:r>
-              <a:rPr lang="en-US" sz="3200" dirty="0" smtClean="0"/>
-              <a:t>What “we99” are Delivering – Plate Map Editor</a:t>
-            </a:r>
-            <a:endParaRPr lang="en-US" sz="3200" dirty="0"/>
-          </a:p>
-        </p:txBody>
-      </p:sp>
-      <p:sp>
-        <p:nvSpPr>
-          <p:cNvPr id="3" name="Content Placeholder 2"/>
-          <p:cNvSpPr>
-            <a:spLocks noGrp="1"/>
-          </p:cNvSpPr>
-          <p:nvPr>
-            <p:ph idx="1"/>
-          </p:nvPr>
-        </p:nvSpPr>
-        <p:spPr/>
-        <p:txBody>
-          <a:bodyPr/>
-          <a:lstStyle/>
-          <a:p>
-            <a:endParaRPr lang="en-US" dirty="0"/>
-          </a:p>
-        </p:txBody>
-      </p:sp>
-    </p:spTree>
-    <p:extLst>
-      <p:ext uri="{BB962C8B-B14F-4D97-AF65-F5344CB8AC3E}">
-        <p14:creationId xmlns:p14="http://schemas.microsoft.com/office/powerpoint/2010/main" val="235299588"/>
-      </p:ext>
-    </p:extLst>
-  </p:cSld>
-  <p:clrMapOvr>
-    <a:masterClrMapping/>
-  </p:clrMapOvr>
-</p:sld>
-</file>
-
-<file path=ppt/slides/slide6.xml><?xml version="1.0" encoding="utf-8"?>
 <p:sld xmlns:a="http://schemas.openxmlformats.org/drawingml/2006/main" xmlns:r="http://schemas.openxmlformats.org/officeDocument/2006/relationships" xmlns:p="http://schemas.openxmlformats.org/presentationml/2006/main">
   <p:cSld>
     <p:spTree>
@@ -5000,7 +3796,7 @@
           </a:ln>
           <a:extLst>
             <a:ext uri="{FAA26D3D-D897-4be2-8F04-BA451C77F1D7}">
-              <ma14:placeholderFlag xmlns:ma14="http://schemas.microsoft.com/office/mac/drawingml/2011/main"/>
+              <ma14:placeholderFlag xmlns:ma14="http://schemas.microsoft.com/office/mac/drawingml/2011/main" xmlns=""/>
             </a:ext>
           </a:extLst>
         </p:spPr>
@@ -5038,7 +3834,7 @@
           </a:ln>
           <a:extLst>
             <a:ext uri="{FAA26D3D-D897-4be2-8F04-BA451C77F1D7}">
-              <ma14:placeholderFlag xmlns:ma14="http://schemas.microsoft.com/office/mac/drawingml/2011/main"/>
+              <ma14:placeholderFlag xmlns:ma14="http://schemas.microsoft.com/office/mac/drawingml/2011/main" xmlns=""/>
             </a:ext>
           </a:extLst>
         </p:spPr>
@@ -5053,10 +3849,17 @@
   <p:clrMapOvr>
     <a:masterClrMapping/>
   </p:clrMapOvr>
+  <p:timing>
+    <p:tnLst>
+      <p:par>
+        <p:cTn id="1" dur="indefinite" restart="never" nodeType="tmRoot"/>
+      </p:par>
+    </p:tnLst>
+  </p:timing>
 </p:sld>
 </file>
 
-<file path=ppt/slides/slide7.xml><?xml version="1.0" encoding="utf-8"?>
+<file path=ppt/slides/slide11.xml><?xml version="1.0" encoding="utf-8"?>
 <p:sld xmlns:a="http://schemas.openxmlformats.org/drawingml/2006/main" xmlns:r="http://schemas.openxmlformats.org/officeDocument/2006/relationships" xmlns:p="http://schemas.openxmlformats.org/presentationml/2006/main">
   <p:cSld>
     <p:spTree>
@@ -5160,7 +3963,7 @@
           <p:nvPr/>
         </p:nvPicPr>
         <p:blipFill>
-          <a:blip r:embed="rId3">
+          <a:blip r:embed="rId3" cstate="email">
             <a:extLst>
               <a:ext uri="{28A0092B-C50C-407E-A947-70E740481C1C}">
                 <a14:useLocalDpi xmlns:a14="http://schemas.microsoft.com/office/drawing/2010/main" val="0"/>
@@ -5186,7 +3989,7 @@
           </a:ln>
           <a:extLst>
             <a:ext uri="{FAA26D3D-D897-4be2-8F04-BA451C77F1D7}">
-              <ma14:placeholderFlag xmlns:ma14="http://schemas.microsoft.com/office/mac/drawingml/2011/main"/>
+              <ma14:placeholderFlag xmlns:ma14="http://schemas.microsoft.com/office/mac/drawingml/2011/main" xmlns=""/>
             </a:ext>
           </a:extLst>
         </p:spPr>
@@ -5201,6 +4004,1882 @@
   <p:clrMapOvr>
     <a:masterClrMapping/>
   </p:clrMapOvr>
+  <p:timing>
+    <p:tnLst>
+      <p:par>
+        <p:cTn id="1" dur="indefinite" restart="never" nodeType="tmRoot"/>
+      </p:par>
+    </p:tnLst>
+  </p:timing>
+</p:sld>
+</file>
+
+<file path=ppt/slides/slide12.xml><?xml version="1.0" encoding="utf-8"?>
+<p:sld xmlns:a="http://schemas.openxmlformats.org/drawingml/2006/main" xmlns:r="http://schemas.openxmlformats.org/officeDocument/2006/relationships" xmlns:p="http://schemas.openxmlformats.org/presentationml/2006/main">
+  <p:cSld>
+    <p:spTree>
+      <p:nvGrpSpPr>
+        <p:cNvPr id="1" name=""/>
+        <p:cNvGrpSpPr/>
+        <p:nvPr/>
+      </p:nvGrpSpPr>
+      <p:grpSpPr>
+        <a:xfrm>
+          <a:off x="0" y="0"/>
+          <a:ext cx="0" cy="0"/>
+          <a:chOff x="0" y="0"/>
+          <a:chExt cx="0" cy="0"/>
+        </a:xfrm>
+      </p:grpSpPr>
+      <p:sp>
+        <p:nvSpPr>
+          <p:cNvPr id="2" name="Title 1"/>
+          <p:cNvSpPr>
+            <a:spLocks noGrp="1"/>
+          </p:cNvSpPr>
+          <p:nvPr>
+            <p:ph type="title"/>
+          </p:nvPr>
+        </p:nvSpPr>
+        <p:spPr/>
+        <p:txBody>
+          <a:bodyPr/>
+          <a:lstStyle/>
+          <a:p>
+            <a:r>
+              <a:rPr lang="en-US" dirty="0" smtClean="0"/>
+              <a:t>System Architecture</a:t>
+            </a:r>
+            <a:endParaRPr lang="en-US" dirty="0"/>
+          </a:p>
+        </p:txBody>
+      </p:sp>
+      <p:sp>
+        <p:nvSpPr>
+          <p:cNvPr id="3" name="Content Placeholder 2"/>
+          <p:cNvSpPr>
+            <a:spLocks noGrp="1"/>
+          </p:cNvSpPr>
+          <p:nvPr>
+            <p:ph idx="1"/>
+          </p:nvPr>
+        </p:nvSpPr>
+        <p:spPr/>
+        <p:txBody>
+          <a:bodyPr/>
+          <a:lstStyle/>
+          <a:p>
+            <a:r>
+              <a:rPr lang="en-US" dirty="0" smtClean="0"/>
+              <a:t>Insert Hardware Requirements</a:t>
+            </a:r>
+          </a:p>
+          <a:p>
+            <a:r>
+              <a:rPr lang="en-US" dirty="0" smtClean="0"/>
+              <a:t>Software Requirements / Databases</a:t>
+            </a:r>
+          </a:p>
+          <a:p>
+            <a:r>
+              <a:rPr lang="en-US" dirty="0" smtClean="0"/>
+              <a:t>Diagrams / Design Ideas</a:t>
+            </a:r>
+            <a:endParaRPr lang="en-US" dirty="0"/>
+          </a:p>
+        </p:txBody>
+      </p:sp>
+    </p:spTree>
+    <p:extLst>
+      <p:ext uri="{BB962C8B-B14F-4D97-AF65-F5344CB8AC3E}">
+        <p14:creationId xmlns:p14="http://schemas.microsoft.com/office/powerpoint/2010/main" val="3412289552"/>
+      </p:ext>
+    </p:extLst>
+  </p:cSld>
+  <p:clrMapOvr>
+    <a:masterClrMapping/>
+  </p:clrMapOvr>
+</p:sld>
+</file>
+
+<file path=ppt/slides/slide13.xml><?xml version="1.0" encoding="utf-8"?>
+<p:sld xmlns:a="http://schemas.openxmlformats.org/drawingml/2006/main" xmlns:r="http://schemas.openxmlformats.org/officeDocument/2006/relationships" xmlns:p="http://schemas.openxmlformats.org/presentationml/2006/main">
+  <p:cSld>
+    <p:spTree>
+      <p:nvGrpSpPr>
+        <p:cNvPr id="1" name=""/>
+        <p:cNvGrpSpPr/>
+        <p:nvPr/>
+      </p:nvGrpSpPr>
+      <p:grpSpPr>
+        <a:xfrm>
+          <a:off x="0" y="0"/>
+          <a:ext cx="0" cy="0"/>
+          <a:chOff x="0" y="0"/>
+          <a:chExt cx="0" cy="0"/>
+        </a:xfrm>
+      </p:grpSpPr>
+      <p:sp>
+        <p:nvSpPr>
+          <p:cNvPr id="2" name="Title 1"/>
+          <p:cNvSpPr>
+            <a:spLocks noGrp="1"/>
+          </p:cNvSpPr>
+          <p:nvPr>
+            <p:ph type="title"/>
+          </p:nvPr>
+        </p:nvSpPr>
+        <p:spPr/>
+        <p:txBody>
+          <a:bodyPr/>
+          <a:lstStyle/>
+          <a:p>
+            <a:r>
+              <a:rPr lang="en-US" dirty="0" smtClean="0"/>
+              <a:t>Web Services</a:t>
+            </a:r>
+            <a:endParaRPr lang="en-US" dirty="0"/>
+          </a:p>
+        </p:txBody>
+      </p:sp>
+      <p:sp>
+        <p:nvSpPr>
+          <p:cNvPr id="3" name="Content Placeholder 2"/>
+          <p:cNvSpPr>
+            <a:spLocks noGrp="1"/>
+          </p:cNvSpPr>
+          <p:nvPr>
+            <p:ph idx="1"/>
+          </p:nvPr>
+        </p:nvSpPr>
+        <p:spPr/>
+        <p:txBody>
+          <a:bodyPr/>
+          <a:lstStyle/>
+          <a:p>
+            <a:endParaRPr lang="en-US" dirty="0"/>
+          </a:p>
+        </p:txBody>
+      </p:sp>
+    </p:spTree>
+    <p:extLst>
+      <p:ext uri="{BB962C8B-B14F-4D97-AF65-F5344CB8AC3E}">
+        <p14:creationId xmlns:p14="http://schemas.microsoft.com/office/powerpoint/2010/main" val="2634932234"/>
+      </p:ext>
+    </p:extLst>
+  </p:cSld>
+  <p:clrMapOvr>
+    <a:masterClrMapping/>
+  </p:clrMapOvr>
+</p:sld>
+</file>
+
+<file path=ppt/slides/slide14.xml><?xml version="1.0" encoding="utf-8"?>
+<p:sld xmlns:a="http://schemas.openxmlformats.org/drawingml/2006/main" xmlns:r="http://schemas.openxmlformats.org/officeDocument/2006/relationships" xmlns:p="http://schemas.openxmlformats.org/presentationml/2006/main">
+  <p:cSld>
+    <p:spTree>
+      <p:nvGrpSpPr>
+        <p:cNvPr id="1" name=""/>
+        <p:cNvGrpSpPr/>
+        <p:nvPr/>
+      </p:nvGrpSpPr>
+      <p:grpSpPr>
+        <a:xfrm>
+          <a:off x="0" y="0"/>
+          <a:ext cx="0" cy="0"/>
+          <a:chOff x="0" y="0"/>
+          <a:chExt cx="0" cy="0"/>
+        </a:xfrm>
+      </p:grpSpPr>
+      <p:sp>
+        <p:nvSpPr>
+          <p:cNvPr id="2" name="Title 1"/>
+          <p:cNvSpPr>
+            <a:spLocks noGrp="1"/>
+          </p:cNvSpPr>
+          <p:nvPr>
+            <p:ph type="title"/>
+          </p:nvPr>
+        </p:nvSpPr>
+        <p:spPr/>
+        <p:txBody>
+          <a:bodyPr/>
+          <a:lstStyle/>
+          <a:p>
+            <a:r>
+              <a:rPr lang="en-US" dirty="0" smtClean="0"/>
+              <a:t>Front End</a:t>
+            </a:r>
+            <a:endParaRPr lang="en-US" dirty="0"/>
+          </a:p>
+        </p:txBody>
+      </p:sp>
+      <p:sp>
+        <p:nvSpPr>
+          <p:cNvPr id="3" name="Content Placeholder 2"/>
+          <p:cNvSpPr>
+            <a:spLocks noGrp="1"/>
+          </p:cNvSpPr>
+          <p:nvPr>
+            <p:ph idx="1"/>
+          </p:nvPr>
+        </p:nvSpPr>
+        <p:spPr/>
+        <p:txBody>
+          <a:bodyPr/>
+          <a:lstStyle/>
+          <a:p>
+            <a:endParaRPr lang="en-US" dirty="0"/>
+          </a:p>
+        </p:txBody>
+      </p:sp>
+    </p:spTree>
+    <p:extLst>
+      <p:ext uri="{BB962C8B-B14F-4D97-AF65-F5344CB8AC3E}">
+        <p14:creationId xmlns:p14="http://schemas.microsoft.com/office/powerpoint/2010/main" val="831731777"/>
+      </p:ext>
+    </p:extLst>
+  </p:cSld>
+  <p:clrMapOvr>
+    <a:masterClrMapping/>
+  </p:clrMapOvr>
+</p:sld>
+</file>
+
+<file path=ppt/slides/slide15.xml><?xml version="1.0" encoding="utf-8"?>
+<p:sld xmlns:a="http://schemas.openxmlformats.org/drawingml/2006/main" xmlns:r="http://schemas.openxmlformats.org/officeDocument/2006/relationships" xmlns:p="http://schemas.openxmlformats.org/presentationml/2006/main">
+  <p:cSld>
+    <p:spTree>
+      <p:nvGrpSpPr>
+        <p:cNvPr id="1" name=""/>
+        <p:cNvGrpSpPr/>
+        <p:nvPr/>
+      </p:nvGrpSpPr>
+      <p:grpSpPr>
+        <a:xfrm>
+          <a:off x="0" y="0"/>
+          <a:ext cx="0" cy="0"/>
+          <a:chOff x="0" y="0"/>
+          <a:chExt cx="0" cy="0"/>
+        </a:xfrm>
+      </p:grpSpPr>
+      <p:sp>
+        <p:nvSpPr>
+          <p:cNvPr id="2" name="Title 1"/>
+          <p:cNvSpPr>
+            <a:spLocks noGrp="1"/>
+          </p:cNvSpPr>
+          <p:nvPr>
+            <p:ph type="title"/>
+          </p:nvPr>
+        </p:nvSpPr>
+        <p:spPr/>
+        <p:txBody>
+          <a:bodyPr/>
+          <a:lstStyle/>
+          <a:p>
+            <a:r>
+              <a:rPr lang="en-US" dirty="0" smtClean="0"/>
+              <a:t>Project Risks</a:t>
+            </a:r>
+            <a:endParaRPr lang="en-US" dirty="0"/>
+          </a:p>
+        </p:txBody>
+      </p:sp>
+      <p:sp>
+        <p:nvSpPr>
+          <p:cNvPr id="3" name="Content Placeholder 2"/>
+          <p:cNvSpPr>
+            <a:spLocks noGrp="1"/>
+          </p:cNvSpPr>
+          <p:nvPr>
+            <p:ph idx="1"/>
+          </p:nvPr>
+        </p:nvSpPr>
+        <p:spPr/>
+        <p:txBody>
+          <a:bodyPr>
+            <a:normAutofit fontScale="92500" lnSpcReduction="10000"/>
+          </a:bodyPr>
+          <a:lstStyle/>
+          <a:p>
+            <a:pPr marL="0" indent="0">
+              <a:buNone/>
+            </a:pPr>
+            <a:r>
+              <a:rPr lang="en-US" dirty="0" smtClean="0"/>
+              <a:t>Risks</a:t>
+            </a:r>
+          </a:p>
+          <a:p>
+            <a:pPr lvl="1"/>
+            <a:r>
+              <a:rPr lang="en-US" dirty="0" smtClean="0"/>
+              <a:t>Integration with other teams</a:t>
+            </a:r>
+          </a:p>
+          <a:p>
+            <a:pPr lvl="2"/>
+            <a:r>
+              <a:rPr lang="en-US" dirty="0" smtClean="0"/>
+              <a:t>Design meetings with other teams planned</a:t>
+            </a:r>
+          </a:p>
+          <a:p>
+            <a:pPr lvl="1"/>
+            <a:endParaRPr lang="en-US" dirty="0" smtClean="0"/>
+          </a:p>
+          <a:p>
+            <a:pPr lvl="1"/>
+            <a:r>
+              <a:rPr lang="en-US" dirty="0" smtClean="0"/>
+              <a:t>Stories take longer that estimated</a:t>
+            </a:r>
+          </a:p>
+          <a:p>
+            <a:pPr lvl="2"/>
+            <a:r>
+              <a:rPr lang="en-US" dirty="0" smtClean="0"/>
+              <a:t>Keep a burn-up chart and prioritize stories</a:t>
+            </a:r>
+          </a:p>
+          <a:p>
+            <a:pPr lvl="1"/>
+            <a:endParaRPr lang="en-US" dirty="0" smtClean="0"/>
+          </a:p>
+          <a:p>
+            <a:pPr lvl="1"/>
+            <a:r>
+              <a:rPr lang="en-US" dirty="0" smtClean="0"/>
+              <a:t>Getting of Good Test Data</a:t>
+            </a:r>
+          </a:p>
+          <a:p>
+            <a:pPr lvl="2"/>
+            <a:r>
+              <a:rPr lang="en-US" dirty="0" smtClean="0"/>
+              <a:t>Professor and TA may be able to get more</a:t>
+            </a:r>
+          </a:p>
+          <a:p>
+            <a:endParaRPr lang="en-US" dirty="0" smtClean="0"/>
+          </a:p>
+          <a:p>
+            <a:r>
+              <a:rPr lang="en-US" dirty="0" smtClean="0"/>
+              <a:t>Testing Strategy</a:t>
+            </a:r>
+          </a:p>
+          <a:p>
+            <a:pPr lvl="1"/>
+            <a:r>
+              <a:rPr lang="en-US" dirty="0" smtClean="0"/>
+              <a:t>Test Driven Design</a:t>
+            </a:r>
+          </a:p>
+          <a:p>
+            <a:pPr lvl="1"/>
+            <a:r>
+              <a:rPr lang="en-US" dirty="0" smtClean="0"/>
+              <a:t>Joint</a:t>
+            </a:r>
+          </a:p>
+          <a:p>
+            <a:pPr lvl="1"/>
+            <a:r>
+              <a:rPr lang="en-US" dirty="0" smtClean="0"/>
+              <a:t>Frontend TBD</a:t>
+            </a:r>
+          </a:p>
+        </p:txBody>
+      </p:sp>
+    </p:spTree>
+    <p:extLst>
+      <p:ext uri="{BB962C8B-B14F-4D97-AF65-F5344CB8AC3E}">
+        <p14:creationId xmlns:p14="http://schemas.microsoft.com/office/powerpoint/2010/main" val="4258234684"/>
+      </p:ext>
+    </p:extLst>
+  </p:cSld>
+  <p:clrMapOvr>
+    <a:masterClrMapping/>
+  </p:clrMapOvr>
+</p:sld>
+</file>
+
+<file path=ppt/slides/slide16.xml><?xml version="1.0" encoding="utf-8"?>
+<p:sld xmlns:a="http://schemas.openxmlformats.org/drawingml/2006/main" xmlns:r="http://schemas.openxmlformats.org/officeDocument/2006/relationships" xmlns:p="http://schemas.openxmlformats.org/presentationml/2006/main">
+  <p:cSld>
+    <p:spTree>
+      <p:nvGrpSpPr>
+        <p:cNvPr id="1" name=""/>
+        <p:cNvGrpSpPr/>
+        <p:nvPr/>
+      </p:nvGrpSpPr>
+      <p:grpSpPr>
+        <a:xfrm>
+          <a:off x="0" y="0"/>
+          <a:ext cx="0" cy="0"/>
+          <a:chOff x="0" y="0"/>
+          <a:chExt cx="0" cy="0"/>
+        </a:xfrm>
+      </p:grpSpPr>
+      <p:sp>
+        <p:nvSpPr>
+          <p:cNvPr id="2" name="Title 1"/>
+          <p:cNvSpPr>
+            <a:spLocks noGrp="1"/>
+          </p:cNvSpPr>
+          <p:nvPr>
+            <p:ph type="title"/>
+          </p:nvPr>
+        </p:nvSpPr>
+        <p:spPr/>
+        <p:txBody>
+          <a:bodyPr/>
+          <a:lstStyle/>
+          <a:p>
+            <a:r>
+              <a:rPr lang="en-US" dirty="0" smtClean="0"/>
+              <a:t>Project Planning – Team / Tools</a:t>
+            </a:r>
+            <a:endParaRPr lang="en-US" dirty="0"/>
+          </a:p>
+        </p:txBody>
+      </p:sp>
+      <p:sp>
+        <p:nvSpPr>
+          <p:cNvPr id="3" name="Content Placeholder 2"/>
+          <p:cNvSpPr>
+            <a:spLocks noGrp="1"/>
+          </p:cNvSpPr>
+          <p:nvPr>
+            <p:ph idx="1"/>
+          </p:nvPr>
+        </p:nvSpPr>
+        <p:spPr/>
+        <p:txBody>
+          <a:bodyPr/>
+          <a:lstStyle/>
+          <a:p>
+            <a:pPr marL="0" indent="0">
+              <a:buNone/>
+            </a:pPr>
+            <a:r>
+              <a:rPr lang="en-US" dirty="0" smtClean="0"/>
+              <a:t>Division of Labor</a:t>
+            </a:r>
+          </a:p>
+          <a:p>
+            <a:pPr lvl="1"/>
+            <a:r>
+              <a:rPr lang="en-US" dirty="0" smtClean="0"/>
+              <a:t>3 People specializing in Front End work</a:t>
+            </a:r>
+          </a:p>
+          <a:p>
+            <a:pPr lvl="1"/>
+            <a:r>
+              <a:rPr lang="en-US" dirty="0" smtClean="0"/>
+              <a:t>2 People specializing in Back End work</a:t>
+            </a:r>
+          </a:p>
+          <a:p>
+            <a:pPr lvl="1"/>
+            <a:endParaRPr lang="en-US" dirty="0" smtClean="0"/>
+          </a:p>
+          <a:p>
+            <a:pPr lvl="1"/>
+            <a:endParaRPr lang="en-US" dirty="0" smtClean="0"/>
+          </a:p>
+          <a:p>
+            <a:pPr marL="0" indent="0">
+              <a:buNone/>
+            </a:pPr>
+            <a:r>
+              <a:rPr lang="en-US" dirty="0" smtClean="0"/>
+              <a:t>Collaborative Tools</a:t>
+            </a:r>
+          </a:p>
+          <a:p>
+            <a:pPr lvl="1"/>
+            <a:r>
+              <a:rPr lang="en-US" dirty="0" smtClean="0"/>
+              <a:t>Slack (messaging)</a:t>
+            </a:r>
+          </a:p>
+          <a:p>
+            <a:pPr lvl="1"/>
+            <a:r>
+              <a:rPr lang="en-US" dirty="0" smtClean="0"/>
+              <a:t>Git Hub Repository</a:t>
+            </a:r>
+          </a:p>
+          <a:p>
+            <a:pPr lvl="1"/>
+            <a:r>
+              <a:rPr lang="en-US" dirty="0" smtClean="0"/>
+              <a:t>JIRA</a:t>
+            </a:r>
+          </a:p>
+          <a:p>
+            <a:endParaRPr lang="en-US" dirty="0" smtClean="0"/>
+          </a:p>
+        </p:txBody>
+      </p:sp>
+    </p:spTree>
+    <p:extLst>
+      <p:ext uri="{BB962C8B-B14F-4D97-AF65-F5344CB8AC3E}">
+        <p14:creationId xmlns:p14="http://schemas.microsoft.com/office/powerpoint/2010/main" val="1096911352"/>
+      </p:ext>
+    </p:extLst>
+  </p:cSld>
+  <p:clrMapOvr>
+    <a:masterClrMapping/>
+  </p:clrMapOvr>
+</p:sld>
+</file>
+
+<file path=ppt/slides/slide17.xml><?xml version="1.0" encoding="utf-8"?>
+<p:sld xmlns:a="http://schemas.openxmlformats.org/drawingml/2006/main" xmlns:r="http://schemas.openxmlformats.org/officeDocument/2006/relationships" xmlns:p="http://schemas.openxmlformats.org/presentationml/2006/main">
+  <p:cSld>
+    <p:spTree>
+      <p:nvGrpSpPr>
+        <p:cNvPr id="1" name=""/>
+        <p:cNvGrpSpPr/>
+        <p:nvPr/>
+      </p:nvGrpSpPr>
+      <p:grpSpPr>
+        <a:xfrm>
+          <a:off x="0" y="0"/>
+          <a:ext cx="0" cy="0"/>
+          <a:chOff x="0" y="0"/>
+          <a:chExt cx="0" cy="0"/>
+        </a:xfrm>
+      </p:grpSpPr>
+      <p:sp>
+        <p:nvSpPr>
+          <p:cNvPr id="2" name="Title 1"/>
+          <p:cNvSpPr>
+            <a:spLocks noGrp="1"/>
+          </p:cNvSpPr>
+          <p:nvPr>
+            <p:ph type="title"/>
+          </p:nvPr>
+        </p:nvSpPr>
+        <p:spPr/>
+        <p:txBody>
+          <a:bodyPr/>
+          <a:lstStyle/>
+          <a:p>
+            <a:r>
+              <a:rPr lang="en-US" dirty="0" smtClean="0"/>
+              <a:t>Project Planning</a:t>
+            </a:r>
+            <a:endParaRPr lang="en-US" dirty="0"/>
+          </a:p>
+        </p:txBody>
+      </p:sp>
+      <p:sp>
+        <p:nvSpPr>
+          <p:cNvPr id="3" name="Content Placeholder 2"/>
+          <p:cNvSpPr>
+            <a:spLocks noGrp="1"/>
+          </p:cNvSpPr>
+          <p:nvPr>
+            <p:ph idx="1"/>
+          </p:nvPr>
+        </p:nvSpPr>
+        <p:spPr/>
+        <p:txBody>
+          <a:bodyPr/>
+          <a:lstStyle/>
+          <a:p>
+            <a:r>
+              <a:rPr lang="en-US" dirty="0" smtClean="0"/>
+              <a:t>10 Iterations</a:t>
+            </a:r>
+          </a:p>
+          <a:p>
+            <a:r>
+              <a:rPr lang="en-US" dirty="0" smtClean="0"/>
+              <a:t>360 Story Points (Project Estimate 720 Hours)</a:t>
+            </a:r>
+          </a:p>
+          <a:p>
+            <a:r>
+              <a:rPr lang="en-US" dirty="0" smtClean="0"/>
+              <a:t>Burn-up Calculated weekly</a:t>
+            </a:r>
+          </a:p>
+          <a:p>
+            <a:endParaRPr lang="en-US" dirty="0" smtClean="0"/>
+          </a:p>
+        </p:txBody>
+      </p:sp>
+      <p:pic>
+        <p:nvPicPr>
+          <p:cNvPr id="4" name="Picture 3" descr="BurnUpChart.png"/>
+          <p:cNvPicPr>
+            <a:picLocks noChangeAspect="1"/>
+          </p:cNvPicPr>
+          <p:nvPr/>
+        </p:nvPicPr>
+        <p:blipFill>
+          <a:blip r:embed="rId2" cstate="email">
+            <a:extLst>
+              <a:ext uri="{28A0092B-C50C-407E-A947-70E740481C1C}">
+                <a14:useLocalDpi xmlns:a14="http://schemas.microsoft.com/office/drawing/2010/main" val="0"/>
+              </a:ext>
+            </a:extLst>
+          </a:blip>
+          <a:stretch>
+            <a:fillRect/>
+          </a:stretch>
+        </p:blipFill>
+        <p:spPr>
+          <a:xfrm>
+            <a:off x="1701800" y="3225800"/>
+            <a:ext cx="5504688" cy="2761488"/>
+          </a:xfrm>
+          <a:prstGeom prst="rect">
+            <a:avLst/>
+          </a:prstGeom>
+        </p:spPr>
+      </p:pic>
+    </p:spTree>
+    <p:extLst>
+      <p:ext uri="{BB962C8B-B14F-4D97-AF65-F5344CB8AC3E}">
+        <p14:creationId xmlns:p14="http://schemas.microsoft.com/office/powerpoint/2010/main" val="3210332075"/>
+      </p:ext>
+    </p:extLst>
+  </p:cSld>
+  <p:clrMapOvr>
+    <a:masterClrMapping/>
+  </p:clrMapOvr>
+</p:sld>
+</file>
+
+<file path=ppt/slides/slide18.xml><?xml version="1.0" encoding="utf-8"?>
+<p:sld xmlns:a="http://schemas.openxmlformats.org/drawingml/2006/main" xmlns:r="http://schemas.openxmlformats.org/officeDocument/2006/relationships" xmlns:p="http://schemas.openxmlformats.org/presentationml/2006/main">
+  <p:cSld>
+    <p:spTree>
+      <p:nvGrpSpPr>
+        <p:cNvPr id="1" name=""/>
+        <p:cNvGrpSpPr/>
+        <p:nvPr/>
+      </p:nvGrpSpPr>
+      <p:grpSpPr>
+        <a:xfrm>
+          <a:off x="0" y="0"/>
+          <a:ext cx="0" cy="0"/>
+          <a:chOff x="0" y="0"/>
+          <a:chExt cx="0" cy="0"/>
+        </a:xfrm>
+      </p:grpSpPr>
+      <p:sp>
+        <p:nvSpPr>
+          <p:cNvPr id="2" name="Title 1"/>
+          <p:cNvSpPr>
+            <a:spLocks noGrp="1"/>
+          </p:cNvSpPr>
+          <p:nvPr>
+            <p:ph type="title"/>
+          </p:nvPr>
+        </p:nvSpPr>
+        <p:spPr/>
+        <p:txBody>
+          <a:bodyPr/>
+          <a:lstStyle/>
+          <a:p>
+            <a:r>
+              <a:rPr lang="en-US" dirty="0" smtClean="0"/>
+              <a:t>Key Milestones</a:t>
+            </a:r>
+            <a:endParaRPr lang="en-US" dirty="0"/>
+          </a:p>
+        </p:txBody>
+      </p:sp>
+      <p:sp>
+        <p:nvSpPr>
+          <p:cNvPr id="3" name="Content Placeholder 2"/>
+          <p:cNvSpPr>
+            <a:spLocks noGrp="1"/>
+          </p:cNvSpPr>
+          <p:nvPr>
+            <p:ph idx="1"/>
+          </p:nvPr>
+        </p:nvSpPr>
+        <p:spPr/>
+        <p:txBody>
+          <a:bodyPr>
+            <a:normAutofit fontScale="92500" lnSpcReduction="10000"/>
+          </a:bodyPr>
+          <a:lstStyle/>
+          <a:p>
+            <a:r>
+              <a:rPr lang="en-US" dirty="0" smtClean="0"/>
+              <a:t>Milestone 2 Deliverables</a:t>
+            </a:r>
+          </a:p>
+          <a:p>
+            <a:pPr lvl="1"/>
+            <a:r>
+              <a:rPr lang="en-US" dirty="0" smtClean="0"/>
+              <a:t>Screen Process Flow</a:t>
+            </a:r>
+          </a:p>
+          <a:p>
+            <a:pPr lvl="1"/>
+            <a:r>
+              <a:rPr lang="en-US" dirty="0" smtClean="0"/>
+              <a:t>Domain Model</a:t>
+            </a:r>
+          </a:p>
+          <a:p>
+            <a:pPr lvl="1"/>
+            <a:r>
+              <a:rPr lang="en-US" dirty="0" smtClean="0"/>
+              <a:t>Web Service Interfaces</a:t>
+            </a:r>
+          </a:p>
+          <a:p>
+            <a:pPr lvl="1"/>
+            <a:r>
+              <a:rPr lang="en-US" dirty="0" smtClean="0"/>
+              <a:t>Plate Map Editor</a:t>
+            </a:r>
+          </a:p>
+          <a:p>
+            <a:pPr lvl="1"/>
+            <a:r>
+              <a:rPr lang="en-US" dirty="0" smtClean="0"/>
+              <a:t>Web Services for Plate Editor</a:t>
+            </a:r>
+          </a:p>
+          <a:p>
+            <a:pPr lvl="1"/>
+            <a:r>
+              <a:rPr lang="en-US" dirty="0" smtClean="0"/>
+              <a:t>Web Services for QC Results</a:t>
+            </a:r>
+          </a:p>
+          <a:p>
+            <a:pPr lvl="1"/>
+            <a:r>
+              <a:rPr lang="en-US" dirty="0" smtClean="0"/>
+              <a:t>Heat Maps </a:t>
+            </a:r>
+          </a:p>
+          <a:p>
+            <a:pPr lvl="1"/>
+            <a:r>
+              <a:rPr lang="en-US" dirty="0" smtClean="0"/>
+              <a:t>QC Plates / Experiments </a:t>
+            </a:r>
+          </a:p>
+          <a:p>
+            <a:pPr lvl="1"/>
+            <a:endParaRPr lang="en-US" dirty="0" smtClean="0"/>
+          </a:p>
+          <a:p>
+            <a:r>
+              <a:rPr lang="en-US" dirty="0" smtClean="0"/>
+              <a:t>Milestone 3 Deliverables</a:t>
+            </a:r>
+          </a:p>
+          <a:p>
+            <a:pPr lvl="1"/>
+            <a:r>
+              <a:rPr lang="en-US" dirty="0" smtClean="0"/>
+              <a:t>Interactive Analysis</a:t>
+            </a:r>
+          </a:p>
+          <a:p>
+            <a:pPr lvl="1"/>
+            <a:r>
+              <a:rPr lang="en-US" dirty="0" smtClean="0"/>
+              <a:t>Interactive Dose Response Analysis</a:t>
+            </a:r>
+          </a:p>
+          <a:p>
+            <a:pPr lvl="1"/>
+            <a:r>
+              <a:rPr lang="en-US" dirty="0" smtClean="0"/>
+              <a:t>Save or Publish</a:t>
+            </a:r>
+            <a:endParaRPr lang="en-US" dirty="0"/>
+          </a:p>
+        </p:txBody>
+      </p:sp>
+    </p:spTree>
+    <p:extLst>
+      <p:ext uri="{BB962C8B-B14F-4D97-AF65-F5344CB8AC3E}">
+        <p14:creationId xmlns:p14="http://schemas.microsoft.com/office/powerpoint/2010/main" val="1815632258"/>
+      </p:ext>
+    </p:extLst>
+  </p:cSld>
+  <p:clrMapOvr>
+    <a:masterClrMapping/>
+  </p:clrMapOvr>
+</p:sld>
+</file>
+
+<file path=ppt/slides/slide2.xml><?xml version="1.0" encoding="utf-8"?>
+<p:sld xmlns:a="http://schemas.openxmlformats.org/drawingml/2006/main" xmlns:r="http://schemas.openxmlformats.org/officeDocument/2006/relationships" xmlns:p="http://schemas.openxmlformats.org/presentationml/2006/main">
+  <p:cSld>
+    <p:spTree>
+      <p:nvGrpSpPr>
+        <p:cNvPr id="1" name=""/>
+        <p:cNvGrpSpPr/>
+        <p:nvPr/>
+      </p:nvGrpSpPr>
+      <p:grpSpPr>
+        <a:xfrm>
+          <a:off x="0" y="0"/>
+          <a:ext cx="0" cy="0"/>
+          <a:chOff x="0" y="0"/>
+          <a:chExt cx="0" cy="0"/>
+        </a:xfrm>
+      </p:grpSpPr>
+      <p:sp>
+        <p:nvSpPr>
+          <p:cNvPr id="2" name="Title 1"/>
+          <p:cNvSpPr>
+            <a:spLocks noGrp="1"/>
+          </p:cNvSpPr>
+          <p:nvPr>
+            <p:ph type="title"/>
+          </p:nvPr>
+        </p:nvSpPr>
+        <p:spPr/>
+        <p:txBody>
+          <a:bodyPr/>
+          <a:lstStyle/>
+          <a:p>
+            <a:r>
+              <a:rPr lang="en-US" dirty="0" smtClean="0"/>
+              <a:t>WE99 Team Vision</a:t>
+            </a:r>
+            <a:endParaRPr lang="en-US" dirty="0"/>
+          </a:p>
+        </p:txBody>
+      </p:sp>
+      <p:sp>
+        <p:nvSpPr>
+          <p:cNvPr id="3" name="Content Placeholder 2"/>
+          <p:cNvSpPr>
+            <a:spLocks noGrp="1"/>
+          </p:cNvSpPr>
+          <p:nvPr>
+            <p:ph idx="1"/>
+          </p:nvPr>
+        </p:nvSpPr>
+        <p:spPr/>
+        <p:txBody>
+          <a:bodyPr>
+            <a:normAutofit fontScale="70000" lnSpcReduction="20000"/>
+          </a:bodyPr>
+          <a:lstStyle/>
+          <a:p>
+            <a:pPr marL="0" indent="0" algn="ctr">
+              <a:buNone/>
+            </a:pPr>
+            <a:r>
+              <a:rPr lang="en-US" dirty="0" smtClean="0"/>
+              <a:t>The </a:t>
+            </a:r>
+            <a:r>
+              <a:rPr lang="en-US" dirty="0"/>
+              <a:t>team focus is providing outstanding tools to assist in analyzing the dose response characteristics potential drugs.</a:t>
+            </a:r>
+          </a:p>
+          <a:p>
+            <a:pPr marL="0" indent="0" algn="ctr">
+              <a:buNone/>
+            </a:pPr>
+            <a:r>
+              <a:rPr lang="en-US" dirty="0"/>
+              <a:t> </a:t>
+            </a:r>
+          </a:p>
+          <a:p>
+            <a:pPr marL="0" indent="0" algn="ctr">
+              <a:buNone/>
+            </a:pPr>
+            <a:r>
+              <a:rPr lang="en-US" dirty="0"/>
+              <a:t>We will provide beautiful interactive visualization tools that will assist the scientist in:</a:t>
+            </a:r>
+          </a:p>
+          <a:p>
+            <a:pPr marL="0" indent="0" algn="ctr">
+              <a:buNone/>
+            </a:pPr>
+            <a:r>
+              <a:rPr lang="en-US" dirty="0"/>
+              <a:t> </a:t>
+            </a:r>
+          </a:p>
+          <a:p>
+            <a:pPr lvl="0"/>
+            <a:r>
+              <a:rPr lang="en-US" dirty="0"/>
+              <a:t>Creating and managing experimental plate sets for dose response experiments</a:t>
+            </a:r>
+          </a:p>
+          <a:p>
+            <a:pPr lvl="0"/>
+            <a:r>
+              <a:rPr lang="en-US" dirty="0"/>
+              <a:t>Performing quality control checks on plate results and plate controls</a:t>
+            </a:r>
+          </a:p>
+          <a:p>
+            <a:pPr lvl="0"/>
+            <a:r>
+              <a:rPr lang="en-US" dirty="0"/>
+              <a:t>Performing Interactive analysis of dose response results.</a:t>
+            </a:r>
+          </a:p>
+          <a:p>
+            <a:pPr marL="0" indent="0" algn="ctr">
+              <a:buNone/>
+            </a:pPr>
+            <a:r>
+              <a:rPr lang="en-US" dirty="0"/>
+              <a:t> </a:t>
+            </a:r>
+          </a:p>
+          <a:p>
+            <a:pPr marL="0" indent="0" algn="ctr">
+              <a:buNone/>
+            </a:pPr>
+            <a:r>
+              <a:rPr lang="en-US" dirty="0"/>
+              <a:t> </a:t>
+            </a:r>
+          </a:p>
+          <a:p>
+            <a:pPr marL="0" indent="0" algn="ctr">
+              <a:buNone/>
+            </a:pPr>
+            <a:r>
+              <a:rPr lang="en-US" dirty="0"/>
+              <a:t>The team will store the experimental results and the analysis of the results so that the historic experimental analysis can be reviewed or reproduced at any time.</a:t>
+            </a:r>
+          </a:p>
+          <a:p>
+            <a:pPr marL="0" indent="0" algn="ctr">
+              <a:buNone/>
+            </a:pPr>
+            <a:r>
+              <a:rPr lang="en-US" dirty="0"/>
+              <a:t> </a:t>
+            </a:r>
+          </a:p>
+          <a:p>
+            <a:pPr marL="0" indent="0" algn="ctr">
+              <a:buNone/>
+            </a:pPr>
+            <a:r>
+              <a:rPr lang="en-US" dirty="0"/>
+              <a:t>Scientists will be able to save the results for further analysis or publish their analysis, making it available to all other users.</a:t>
+            </a:r>
+          </a:p>
+          <a:p>
+            <a:pPr marL="0" indent="0">
+              <a:buNone/>
+            </a:pPr>
+            <a:endParaRPr lang="en-US" dirty="0"/>
+          </a:p>
+        </p:txBody>
+      </p:sp>
+    </p:spTree>
+    <p:extLst>
+      <p:ext uri="{BB962C8B-B14F-4D97-AF65-F5344CB8AC3E}">
+        <p14:creationId xmlns:p14="http://schemas.microsoft.com/office/powerpoint/2010/main" val="994059251"/>
+      </p:ext>
+    </p:extLst>
+  </p:cSld>
+  <p:clrMapOvr>
+    <a:masterClrMapping/>
+  </p:clrMapOvr>
+  <p:timing>
+    <p:tnLst>
+      <p:par>
+        <p:cTn id="1" dur="indefinite" restart="never" nodeType="tmRoot"/>
+      </p:par>
+    </p:tnLst>
+  </p:timing>
+</p:sld>
+</file>
+
+<file path=ppt/slides/slide3.xml><?xml version="1.0" encoding="utf-8"?>
+<p:sld xmlns:a="http://schemas.openxmlformats.org/drawingml/2006/main" xmlns:r="http://schemas.openxmlformats.org/officeDocument/2006/relationships" xmlns:p="http://schemas.openxmlformats.org/presentationml/2006/main">
+  <p:cSld>
+    <p:spTree>
+      <p:nvGrpSpPr>
+        <p:cNvPr id="1" name=""/>
+        <p:cNvGrpSpPr/>
+        <p:nvPr/>
+      </p:nvGrpSpPr>
+      <p:grpSpPr>
+        <a:xfrm>
+          <a:off x="0" y="0"/>
+          <a:ext cx="0" cy="0"/>
+          <a:chOff x="0" y="0"/>
+          <a:chExt cx="0" cy="0"/>
+        </a:xfrm>
+      </p:grpSpPr>
+      <p:sp>
+        <p:nvSpPr>
+          <p:cNvPr id="2" name="Title 1"/>
+          <p:cNvSpPr>
+            <a:spLocks noGrp="1"/>
+          </p:cNvSpPr>
+          <p:nvPr>
+            <p:ph type="title"/>
+          </p:nvPr>
+        </p:nvSpPr>
+        <p:spPr/>
+        <p:txBody>
+          <a:bodyPr/>
+          <a:lstStyle/>
+          <a:p>
+            <a:r>
+              <a:rPr lang="en-US" dirty="0" smtClean="0"/>
+              <a:t>Business Opportunity</a:t>
+            </a:r>
+            <a:endParaRPr lang="en-US" dirty="0"/>
+          </a:p>
+        </p:txBody>
+      </p:sp>
+      <p:sp>
+        <p:nvSpPr>
+          <p:cNvPr id="3" name="Content Placeholder 2"/>
+          <p:cNvSpPr>
+            <a:spLocks noGrp="1"/>
+          </p:cNvSpPr>
+          <p:nvPr>
+            <p:ph idx="1"/>
+          </p:nvPr>
+        </p:nvSpPr>
+        <p:spPr/>
+        <p:txBody>
+          <a:bodyPr>
+            <a:normAutofit lnSpcReduction="10000"/>
+          </a:bodyPr>
+          <a:lstStyle/>
+          <a:p>
+            <a:r>
+              <a:rPr lang="en-US" dirty="0" smtClean="0"/>
+              <a:t>High </a:t>
+            </a:r>
+            <a:r>
+              <a:rPr lang="en-US" dirty="0"/>
+              <a:t>throughput screening </a:t>
+            </a:r>
+            <a:r>
+              <a:rPr lang="en-US" dirty="0" smtClean="0"/>
+              <a:t>tests </a:t>
+            </a:r>
+            <a:r>
+              <a:rPr lang="en-US" dirty="0"/>
+              <a:t>millions of potential drugs</a:t>
+            </a:r>
+            <a:r>
+              <a:rPr lang="en-US" dirty="0" smtClean="0"/>
+              <a:t>.</a:t>
+            </a:r>
+          </a:p>
+          <a:p>
+            <a:endParaRPr lang="en-US" dirty="0" smtClean="0"/>
+          </a:p>
+          <a:p>
+            <a:r>
+              <a:rPr lang="en-US" dirty="0" smtClean="0"/>
+              <a:t>Commercial software is expensive</a:t>
+            </a:r>
+          </a:p>
+          <a:p>
+            <a:endParaRPr lang="en-US" dirty="0" smtClean="0"/>
+          </a:p>
+          <a:p>
+            <a:r>
+              <a:rPr lang="en-US" dirty="0" smtClean="0"/>
+              <a:t>Enable Scientists to be </a:t>
+            </a:r>
+            <a:r>
+              <a:rPr lang="en-US" dirty="0"/>
+              <a:t>organized and efficient when screening </a:t>
+            </a:r>
+            <a:r>
+              <a:rPr lang="en-US" dirty="0" smtClean="0"/>
+              <a:t>potential </a:t>
+            </a:r>
+            <a:r>
+              <a:rPr lang="en-US" dirty="0"/>
+              <a:t>drugs. </a:t>
+            </a:r>
+            <a:endParaRPr lang="en-US" dirty="0" smtClean="0"/>
+          </a:p>
+          <a:p>
+            <a:endParaRPr lang="en-US" dirty="0"/>
+          </a:p>
+          <a:p>
+            <a:r>
+              <a:rPr lang="en-US" dirty="0" smtClean="0"/>
+              <a:t>Dynamic analysis tools help reduce the number of experiments.</a:t>
+            </a:r>
+          </a:p>
+          <a:p>
+            <a:endParaRPr lang="en-US" dirty="0" smtClean="0"/>
+          </a:p>
+          <a:p>
+            <a:r>
+              <a:rPr lang="en-US" dirty="0" smtClean="0"/>
+              <a:t>Eliminate </a:t>
+            </a:r>
+            <a:r>
+              <a:rPr lang="en-US" dirty="0"/>
+              <a:t>compounds earlier in the discovery </a:t>
+            </a:r>
+            <a:r>
+              <a:rPr lang="en-US" dirty="0" smtClean="0"/>
+              <a:t>cycle.</a:t>
+            </a:r>
+            <a:endParaRPr lang="en-US" dirty="0"/>
+          </a:p>
+        </p:txBody>
+      </p:sp>
+    </p:spTree>
+    <p:extLst>
+      <p:ext uri="{BB962C8B-B14F-4D97-AF65-F5344CB8AC3E}">
+        <p14:creationId xmlns:p14="http://schemas.microsoft.com/office/powerpoint/2010/main" val="2700570494"/>
+      </p:ext>
+    </p:extLst>
+  </p:cSld>
+  <p:clrMapOvr>
+    <a:masterClrMapping/>
+  </p:clrMapOvr>
+  <p:timing>
+    <p:tnLst>
+      <p:par>
+        <p:cTn id="1" dur="indefinite" restart="never" nodeType="tmRoot"/>
+      </p:par>
+    </p:tnLst>
+  </p:timing>
+</p:sld>
+</file>
+
+<file path=ppt/slides/slide4.xml><?xml version="1.0" encoding="utf-8"?>
+<p:sld xmlns:a="http://schemas.openxmlformats.org/drawingml/2006/main" xmlns:r="http://schemas.openxmlformats.org/officeDocument/2006/relationships" xmlns:p="http://schemas.openxmlformats.org/presentationml/2006/main">
+  <p:cSld>
+    <p:spTree>
+      <p:nvGrpSpPr>
+        <p:cNvPr id="1" name=""/>
+        <p:cNvGrpSpPr/>
+        <p:nvPr/>
+      </p:nvGrpSpPr>
+      <p:grpSpPr>
+        <a:xfrm>
+          <a:off x="0" y="0"/>
+          <a:ext cx="0" cy="0"/>
+          <a:chOff x="0" y="0"/>
+          <a:chExt cx="0" cy="0"/>
+        </a:xfrm>
+      </p:grpSpPr>
+      <p:sp>
+        <p:nvSpPr>
+          <p:cNvPr id="2" name="Title 1"/>
+          <p:cNvSpPr>
+            <a:spLocks noGrp="1"/>
+          </p:cNvSpPr>
+          <p:nvPr>
+            <p:ph type="title"/>
+          </p:nvPr>
+        </p:nvSpPr>
+        <p:spPr/>
+        <p:txBody>
+          <a:bodyPr/>
+          <a:lstStyle/>
+          <a:p>
+            <a:r>
+              <a:rPr lang="en-US" dirty="0" smtClean="0"/>
+              <a:t>Presentation Outline</a:t>
+            </a:r>
+            <a:endParaRPr lang="en-US" dirty="0"/>
+          </a:p>
+        </p:txBody>
+      </p:sp>
+      <p:sp>
+        <p:nvSpPr>
+          <p:cNvPr id="3" name="Content Placeholder 2"/>
+          <p:cNvSpPr>
+            <a:spLocks noGrp="1"/>
+          </p:cNvSpPr>
+          <p:nvPr>
+            <p:ph idx="1"/>
+          </p:nvPr>
+        </p:nvSpPr>
+        <p:spPr/>
+        <p:txBody>
+          <a:bodyPr/>
+          <a:lstStyle/>
+          <a:p>
+            <a:pPr marL="0" indent="0">
+              <a:buNone/>
+            </a:pPr>
+            <a:r>
+              <a:rPr lang="en-US" dirty="0" smtClean="0"/>
+              <a:t>Overview of Presentation</a:t>
+            </a:r>
+          </a:p>
+          <a:p>
+            <a:pPr marL="0" indent="0">
+              <a:buNone/>
+            </a:pPr>
+            <a:endParaRPr lang="en-US" dirty="0" smtClean="0"/>
+          </a:p>
+          <a:p>
+            <a:r>
+              <a:rPr lang="en-US" dirty="0" smtClean="0"/>
+              <a:t>Plate Editing and Creation – Alex</a:t>
+            </a:r>
+          </a:p>
+          <a:p>
+            <a:r>
+              <a:rPr lang="en-US" dirty="0" smtClean="0"/>
+              <a:t>Results Analysis – Sean</a:t>
+            </a:r>
+          </a:p>
+          <a:p>
+            <a:r>
+              <a:rPr lang="en-US" dirty="0" smtClean="0"/>
+              <a:t>Architecture – Mark</a:t>
+            </a:r>
+          </a:p>
+          <a:p>
+            <a:r>
+              <a:rPr lang="en-US" dirty="0" smtClean="0"/>
+              <a:t>Front End –</a:t>
+            </a:r>
+            <a:r>
+              <a:rPr lang="en-US" dirty="0"/>
+              <a:t> </a:t>
+            </a:r>
+            <a:r>
+              <a:rPr lang="en-US" dirty="0" smtClean="0"/>
+              <a:t>Tim</a:t>
+            </a:r>
+          </a:p>
+          <a:p>
+            <a:r>
+              <a:rPr lang="en-US" dirty="0" smtClean="0"/>
+              <a:t>Project Planning/Estimates - Alan</a:t>
+            </a:r>
+          </a:p>
+        </p:txBody>
+      </p:sp>
+    </p:spTree>
+    <p:extLst>
+      <p:ext uri="{BB962C8B-B14F-4D97-AF65-F5344CB8AC3E}">
+        <p14:creationId xmlns:p14="http://schemas.microsoft.com/office/powerpoint/2010/main" val="187400791"/>
+      </p:ext>
+    </p:extLst>
+  </p:cSld>
+  <p:clrMapOvr>
+    <a:masterClrMapping/>
+  </p:clrMapOvr>
+  <p:timing>
+    <p:tnLst>
+      <p:par>
+        <p:cTn id="1" dur="indefinite" restart="never" nodeType="tmRoot"/>
+      </p:par>
+    </p:tnLst>
+  </p:timing>
+</p:sld>
+</file>
+
+<file path=ppt/slides/slide5.xml><?xml version="1.0" encoding="utf-8"?>
+<p:sld xmlns:a="http://schemas.openxmlformats.org/drawingml/2006/main" xmlns:r="http://schemas.openxmlformats.org/officeDocument/2006/relationships" xmlns:p="http://schemas.openxmlformats.org/presentationml/2006/main">
+  <p:cSld>
+    <p:spTree>
+      <p:nvGrpSpPr>
+        <p:cNvPr id="1" name=""/>
+        <p:cNvGrpSpPr/>
+        <p:nvPr/>
+      </p:nvGrpSpPr>
+      <p:grpSpPr>
+        <a:xfrm>
+          <a:off x="0" y="0"/>
+          <a:ext cx="0" cy="0"/>
+          <a:chOff x="0" y="0"/>
+          <a:chExt cx="0" cy="0"/>
+        </a:xfrm>
+      </p:grpSpPr>
+      <p:sp>
+        <p:nvSpPr>
+          <p:cNvPr id="2" name="Title 1"/>
+          <p:cNvSpPr>
+            <a:spLocks noGrp="1"/>
+          </p:cNvSpPr>
+          <p:nvPr>
+            <p:ph type="title"/>
+          </p:nvPr>
+        </p:nvSpPr>
+        <p:spPr/>
+        <p:txBody>
+          <a:bodyPr>
+            <a:normAutofit/>
+          </a:bodyPr>
+          <a:lstStyle/>
+          <a:p>
+            <a:r>
+              <a:rPr lang="en-US" sz="3200" dirty="0" smtClean="0"/>
+              <a:t>What “we99” are Delivering – Plate Map Editor</a:t>
+            </a:r>
+            <a:endParaRPr lang="en-US" sz="3200" dirty="0"/>
+          </a:p>
+        </p:txBody>
+      </p:sp>
+      <p:sp>
+        <p:nvSpPr>
+          <p:cNvPr id="3" name="Content Placeholder 2"/>
+          <p:cNvSpPr>
+            <a:spLocks noGrp="1"/>
+          </p:cNvSpPr>
+          <p:nvPr>
+            <p:ph idx="1"/>
+          </p:nvPr>
+        </p:nvSpPr>
+        <p:spPr>
+          <a:xfrm>
+            <a:off x="457200" y="1417320"/>
+            <a:ext cx="8229600" cy="4876800"/>
+          </a:xfrm>
+        </p:spPr>
+        <p:txBody>
+          <a:bodyPr>
+            <a:normAutofit/>
+          </a:bodyPr>
+          <a:lstStyle/>
+          <a:p>
+            <a:pPr marL="0" indent="0">
+              <a:buNone/>
+            </a:pPr>
+            <a:r>
+              <a:rPr lang="en-US" sz="2000" dirty="0" smtClean="0"/>
+              <a:t>Plate Manager / Import – Export</a:t>
+            </a:r>
+          </a:p>
+          <a:p>
+            <a:pPr marL="0" indent="0">
+              <a:buNone/>
+            </a:pPr>
+            <a:endParaRPr lang="en-US" sz="2000" dirty="0"/>
+          </a:p>
+        </p:txBody>
+      </p:sp>
+      <p:pic>
+        <p:nvPicPr>
+          <p:cNvPr id="1027" name="Picture 3"/>
+          <p:cNvPicPr>
+            <a:picLocks noChangeAspect="1" noChangeArrowheads="1"/>
+          </p:cNvPicPr>
+          <p:nvPr/>
+        </p:nvPicPr>
+        <p:blipFill>
+          <a:blip r:embed="rId2" cstate="email">
+            <a:extLst>
+              <a:ext uri="{28A0092B-C50C-407E-A947-70E740481C1C}">
+                <a14:useLocalDpi xmlns:a14="http://schemas.microsoft.com/office/drawing/2010/main" val="0"/>
+              </a:ext>
+            </a:extLst>
+          </a:blip>
+          <a:srcRect/>
+          <a:stretch>
+            <a:fillRect/>
+          </a:stretch>
+        </p:blipFill>
+        <p:spPr bwMode="auto">
+          <a:xfrm>
+            <a:off x="4485640" y="1417320"/>
+            <a:ext cx="4490720" cy="5320286"/>
+          </a:xfrm>
+          <a:prstGeom prst="rect">
+            <a:avLst/>
+          </a:prstGeom>
+          <a:noFill/>
+          <a:ln>
+            <a:noFill/>
+          </a:ln>
+          <a:extLst>
+            <a:ext uri="{909E8E84-426E-40DD-AFC4-6F175D3DCCD1}">
+              <a14:hiddenFill xmlns:a14="http://schemas.microsoft.com/office/drawing/2010/main">
+                <a:solidFill>
+                  <a:schemeClr val="accent1"/>
+                </a:solidFill>
+              </a14:hiddenFill>
+            </a:ext>
+            <a:ext uri="{91240B29-F687-4F45-9708-019B960494DF}">
+              <a14:hiddenLine xmlns:a14="http://schemas.microsoft.com/office/drawing/2010/main" w="9525">
+                <a:solidFill>
+                  <a:schemeClr val="tx1"/>
+                </a:solidFill>
+                <a:miter lim="800000"/>
+                <a:headEnd/>
+                <a:tailEnd/>
+              </a14:hiddenLine>
+            </a:ext>
+          </a:extLst>
+        </p:spPr>
+      </p:pic>
+      <p:sp>
+        <p:nvSpPr>
+          <p:cNvPr id="4" name="TextBox 3"/>
+          <p:cNvSpPr txBox="1"/>
+          <p:nvPr/>
+        </p:nvSpPr>
+        <p:spPr>
+          <a:xfrm>
+            <a:off x="723900" y="1866900"/>
+            <a:ext cx="3535680" cy="2246769"/>
+          </a:xfrm>
+          <a:prstGeom prst="rect">
+            <a:avLst/>
+          </a:prstGeom>
+          <a:noFill/>
+        </p:spPr>
+        <p:txBody>
+          <a:bodyPr wrap="square" rtlCol="0">
+            <a:spAutoFit/>
+          </a:bodyPr>
+          <a:lstStyle/>
+          <a:p>
+            <a:pPr marL="285750" indent="-285750">
+              <a:buFont typeface="Arial" panose="020B0604020202020204" pitchFamily="34" charset="0"/>
+              <a:buChar char="•"/>
+            </a:pPr>
+            <a:r>
+              <a:rPr lang="en-US" sz="1400" dirty="0" smtClean="0"/>
+              <a:t>Import to take data from </a:t>
+            </a:r>
+            <a:r>
+              <a:rPr lang="en-US" sz="1400" dirty="0" err="1" smtClean="0"/>
+              <a:t>json</a:t>
+            </a:r>
+            <a:r>
+              <a:rPr lang="en-US" sz="1400" dirty="0" smtClean="0"/>
+              <a:t> file.</a:t>
+            </a:r>
+          </a:p>
+          <a:p>
+            <a:pPr marL="285750" indent="-285750">
+              <a:buFont typeface="Arial" panose="020B0604020202020204" pitchFamily="34" charset="0"/>
+              <a:buChar char="•"/>
+            </a:pPr>
+            <a:endParaRPr lang="en-US" sz="1400" dirty="0" smtClean="0"/>
+          </a:p>
+          <a:p>
+            <a:pPr marL="285750" indent="-285750">
+              <a:buFont typeface="Arial" panose="020B0604020202020204" pitchFamily="34" charset="0"/>
+              <a:buChar char="•"/>
+            </a:pPr>
+            <a:r>
+              <a:rPr lang="en-US" sz="1400" dirty="0" smtClean="0"/>
+              <a:t>Export to put details of the plate into a </a:t>
+            </a:r>
+            <a:r>
+              <a:rPr lang="en-US" sz="1400" dirty="0" err="1" smtClean="0"/>
+              <a:t>json</a:t>
+            </a:r>
+            <a:r>
+              <a:rPr lang="en-US" sz="1400" dirty="0" smtClean="0"/>
+              <a:t> file</a:t>
+            </a:r>
+          </a:p>
+          <a:p>
+            <a:pPr marL="285750" indent="-285750">
+              <a:buFont typeface="Arial" panose="020B0604020202020204" pitchFamily="34" charset="0"/>
+              <a:buChar char="•"/>
+            </a:pPr>
+            <a:endParaRPr lang="en-US" sz="1400" dirty="0" smtClean="0"/>
+          </a:p>
+          <a:p>
+            <a:pPr marL="285750" indent="-285750">
+              <a:buFont typeface="Arial" panose="020B0604020202020204" pitchFamily="34" charset="0"/>
+              <a:buChar char="•"/>
+            </a:pPr>
+            <a:r>
+              <a:rPr lang="en-US" sz="1400" dirty="0" smtClean="0"/>
+              <a:t>Click actions to update status:</a:t>
+            </a:r>
+          </a:p>
+          <a:p>
+            <a:pPr marL="742950" lvl="1" indent="-285750">
+              <a:buFontTx/>
+              <a:buChar char="-"/>
+            </a:pPr>
+            <a:r>
+              <a:rPr lang="en-US" sz="1400" dirty="0" smtClean="0"/>
+              <a:t>Mark prepared</a:t>
+            </a:r>
+          </a:p>
+          <a:p>
+            <a:pPr marL="742950" lvl="1" indent="-285750">
+              <a:buFontTx/>
+              <a:buChar char="-"/>
+            </a:pPr>
+            <a:r>
+              <a:rPr lang="en-US" sz="1400" dirty="0" smtClean="0"/>
+              <a:t>Send to device</a:t>
+            </a:r>
+          </a:p>
+          <a:p>
+            <a:pPr marL="742950" lvl="1" indent="-285750">
+              <a:buFontTx/>
+              <a:buChar char="-"/>
+            </a:pPr>
+            <a:r>
+              <a:rPr lang="en-US" sz="1400" dirty="0" smtClean="0"/>
+              <a:t>Upload analysis</a:t>
+            </a:r>
+          </a:p>
+          <a:p>
+            <a:pPr marL="742950" lvl="1" indent="-285750">
+              <a:buFontTx/>
+              <a:buChar char="-"/>
+            </a:pPr>
+            <a:r>
+              <a:rPr lang="en-US" sz="1400" dirty="0" smtClean="0"/>
+              <a:t>View analysis</a:t>
+            </a:r>
+            <a:endParaRPr lang="en-US" sz="1400" dirty="0"/>
+          </a:p>
+        </p:txBody>
+      </p:sp>
+    </p:spTree>
+    <p:extLst>
+      <p:ext uri="{BB962C8B-B14F-4D97-AF65-F5344CB8AC3E}">
+        <p14:creationId xmlns:p14="http://schemas.microsoft.com/office/powerpoint/2010/main" val="235299588"/>
+      </p:ext>
+    </p:extLst>
+  </p:cSld>
+  <p:clrMapOvr>
+    <a:masterClrMapping/>
+  </p:clrMapOvr>
+  <p:timing>
+    <p:tnLst>
+      <p:par>
+        <p:cTn id="1" dur="indefinite" restart="never" nodeType="tmRoot"/>
+      </p:par>
+    </p:tnLst>
+  </p:timing>
+</p:sld>
+</file>
+
+<file path=ppt/slides/slide6.xml><?xml version="1.0" encoding="utf-8"?>
+<p:sld xmlns:a="http://schemas.openxmlformats.org/drawingml/2006/main" xmlns:r="http://schemas.openxmlformats.org/officeDocument/2006/relationships" xmlns:p="http://schemas.openxmlformats.org/presentationml/2006/main">
+  <p:cSld>
+    <p:spTree>
+      <p:nvGrpSpPr>
+        <p:cNvPr id="1" name=""/>
+        <p:cNvGrpSpPr/>
+        <p:nvPr/>
+      </p:nvGrpSpPr>
+      <p:grpSpPr>
+        <a:xfrm>
+          <a:off x="0" y="0"/>
+          <a:ext cx="0" cy="0"/>
+          <a:chOff x="0" y="0"/>
+          <a:chExt cx="0" cy="0"/>
+        </a:xfrm>
+      </p:grpSpPr>
+      <p:sp>
+        <p:nvSpPr>
+          <p:cNvPr id="2" name="Title 1"/>
+          <p:cNvSpPr>
+            <a:spLocks noGrp="1"/>
+          </p:cNvSpPr>
+          <p:nvPr>
+            <p:ph type="title"/>
+          </p:nvPr>
+        </p:nvSpPr>
+        <p:spPr/>
+        <p:txBody>
+          <a:bodyPr>
+            <a:normAutofit/>
+          </a:bodyPr>
+          <a:lstStyle/>
+          <a:p>
+            <a:r>
+              <a:rPr lang="en-US" sz="3200" dirty="0" smtClean="0"/>
+              <a:t>What “we99” are Delivering – Plate Map Editor</a:t>
+            </a:r>
+            <a:endParaRPr lang="en-US" sz="3200" dirty="0"/>
+          </a:p>
+        </p:txBody>
+      </p:sp>
+      <p:sp>
+        <p:nvSpPr>
+          <p:cNvPr id="3" name="Content Placeholder 2"/>
+          <p:cNvSpPr>
+            <a:spLocks noGrp="1"/>
+          </p:cNvSpPr>
+          <p:nvPr>
+            <p:ph idx="1"/>
+          </p:nvPr>
+        </p:nvSpPr>
+        <p:spPr>
+          <a:xfrm>
+            <a:off x="457200" y="1417320"/>
+            <a:ext cx="8229600" cy="4876800"/>
+          </a:xfrm>
+        </p:spPr>
+        <p:txBody>
+          <a:bodyPr/>
+          <a:lstStyle/>
+          <a:p>
+            <a:pPr marL="0" indent="0">
+              <a:buNone/>
+            </a:pPr>
+            <a:r>
+              <a:rPr lang="en-US" dirty="0" smtClean="0"/>
+              <a:t>Plate Templates</a:t>
+            </a:r>
+          </a:p>
+          <a:p>
+            <a:r>
+              <a:rPr lang="en-US" sz="1800" dirty="0" smtClean="0"/>
+              <a:t>Plate are created from plate templates</a:t>
+            </a:r>
+            <a:endParaRPr lang="en-US" sz="1800" dirty="0"/>
+          </a:p>
+        </p:txBody>
+      </p:sp>
+      <p:pic>
+        <p:nvPicPr>
+          <p:cNvPr id="4098" name="Picture 2"/>
+          <p:cNvPicPr>
+            <a:picLocks noChangeAspect="1" noChangeArrowheads="1"/>
+          </p:cNvPicPr>
+          <p:nvPr/>
+        </p:nvPicPr>
+        <p:blipFill>
+          <a:blip r:embed="rId2" cstate="email">
+            <a:extLst>
+              <a:ext uri="{28A0092B-C50C-407E-A947-70E740481C1C}">
+                <a14:useLocalDpi xmlns:a14="http://schemas.microsoft.com/office/drawing/2010/main" val="0"/>
+              </a:ext>
+            </a:extLst>
+          </a:blip>
+          <a:srcRect/>
+          <a:stretch>
+            <a:fillRect/>
+          </a:stretch>
+        </p:blipFill>
+        <p:spPr bwMode="auto">
+          <a:xfrm>
+            <a:off x="2095500" y="2551101"/>
+            <a:ext cx="6332220" cy="3484573"/>
+          </a:xfrm>
+          <a:prstGeom prst="rect">
+            <a:avLst/>
+          </a:prstGeom>
+          <a:noFill/>
+          <a:ln>
+            <a:noFill/>
+          </a:ln>
+          <a:extLst>
+            <a:ext uri="{909E8E84-426E-40DD-AFC4-6F175D3DCCD1}">
+              <a14:hiddenFill xmlns:a14="http://schemas.microsoft.com/office/drawing/2010/main">
+                <a:solidFill>
+                  <a:schemeClr val="accent1"/>
+                </a:solidFill>
+              </a14:hiddenFill>
+            </a:ext>
+            <a:ext uri="{91240B29-F687-4F45-9708-019B960494DF}">
+              <a14:hiddenLine xmlns:a14="http://schemas.microsoft.com/office/drawing/2010/main" w="9525">
+                <a:solidFill>
+                  <a:schemeClr val="tx1"/>
+                </a:solidFill>
+                <a:miter lim="800000"/>
+                <a:headEnd/>
+                <a:tailEnd/>
+              </a14:hiddenLine>
+            </a:ext>
+          </a:extLst>
+        </p:spPr>
+      </p:pic>
+    </p:spTree>
+    <p:extLst>
+      <p:ext uri="{BB962C8B-B14F-4D97-AF65-F5344CB8AC3E}">
+        <p14:creationId xmlns:p14="http://schemas.microsoft.com/office/powerpoint/2010/main" val="1773850298"/>
+      </p:ext>
+    </p:extLst>
+  </p:cSld>
+  <p:clrMapOvr>
+    <a:masterClrMapping/>
+  </p:clrMapOvr>
+  <p:timing>
+    <p:tnLst>
+      <p:par>
+        <p:cTn id="1" dur="indefinite" restart="never" nodeType="tmRoot"/>
+      </p:par>
+    </p:tnLst>
+  </p:timing>
+</p:sld>
+</file>
+
+<file path=ppt/slides/slide7.xml><?xml version="1.0" encoding="utf-8"?>
+<p:sld xmlns:a="http://schemas.openxmlformats.org/drawingml/2006/main" xmlns:r="http://schemas.openxmlformats.org/officeDocument/2006/relationships" xmlns:p="http://schemas.openxmlformats.org/presentationml/2006/main">
+  <p:cSld>
+    <p:spTree>
+      <p:nvGrpSpPr>
+        <p:cNvPr id="1" name=""/>
+        <p:cNvGrpSpPr/>
+        <p:nvPr/>
+      </p:nvGrpSpPr>
+      <p:grpSpPr>
+        <a:xfrm>
+          <a:off x="0" y="0"/>
+          <a:ext cx="0" cy="0"/>
+          <a:chOff x="0" y="0"/>
+          <a:chExt cx="0" cy="0"/>
+        </a:xfrm>
+      </p:grpSpPr>
+      <p:sp>
+        <p:nvSpPr>
+          <p:cNvPr id="2" name="Title 1"/>
+          <p:cNvSpPr>
+            <a:spLocks noGrp="1"/>
+          </p:cNvSpPr>
+          <p:nvPr>
+            <p:ph type="title"/>
+          </p:nvPr>
+        </p:nvSpPr>
+        <p:spPr/>
+        <p:txBody>
+          <a:bodyPr>
+            <a:normAutofit/>
+          </a:bodyPr>
+          <a:lstStyle/>
+          <a:p>
+            <a:r>
+              <a:rPr lang="en-US" sz="3200" dirty="0" smtClean="0"/>
+              <a:t>What “we99” are Delivering – Plate Map Editor</a:t>
+            </a:r>
+            <a:endParaRPr lang="en-US" sz="3200" dirty="0"/>
+          </a:p>
+        </p:txBody>
+      </p:sp>
+      <p:sp>
+        <p:nvSpPr>
+          <p:cNvPr id="3" name="Content Placeholder 2"/>
+          <p:cNvSpPr>
+            <a:spLocks noGrp="1"/>
+          </p:cNvSpPr>
+          <p:nvPr>
+            <p:ph idx="1"/>
+          </p:nvPr>
+        </p:nvSpPr>
+        <p:spPr>
+          <a:xfrm>
+            <a:off x="457200" y="1417320"/>
+            <a:ext cx="8229600" cy="4876800"/>
+          </a:xfrm>
+        </p:spPr>
+        <p:txBody>
+          <a:bodyPr/>
+          <a:lstStyle/>
+          <a:p>
+            <a:pPr marL="0" indent="0">
+              <a:buNone/>
+            </a:pPr>
+            <a:r>
+              <a:rPr lang="en-US" dirty="0" smtClean="0"/>
+              <a:t>Add Plate Wizar</a:t>
+            </a:r>
+            <a:r>
+              <a:rPr lang="en-US" dirty="0" smtClean="0"/>
+              <a:t>d – Part 1: Wells and Compounds</a:t>
+            </a:r>
+            <a:endParaRPr lang="en-US" dirty="0"/>
+          </a:p>
+        </p:txBody>
+      </p:sp>
+      <p:pic>
+        <p:nvPicPr>
+          <p:cNvPr id="2050" name="Picture 2"/>
+          <p:cNvPicPr>
+            <a:picLocks noChangeAspect="1" noChangeArrowheads="1"/>
+          </p:cNvPicPr>
+          <p:nvPr/>
+        </p:nvPicPr>
+        <p:blipFill>
+          <a:blip r:embed="rId2" cstate="email">
+            <a:extLst>
+              <a:ext uri="{28A0092B-C50C-407E-A947-70E740481C1C}">
+                <a14:useLocalDpi xmlns:a14="http://schemas.microsoft.com/office/drawing/2010/main" val="0"/>
+              </a:ext>
+            </a:extLst>
+          </a:blip>
+          <a:srcRect/>
+          <a:stretch>
+            <a:fillRect/>
+          </a:stretch>
+        </p:blipFill>
+        <p:spPr bwMode="auto">
+          <a:xfrm>
+            <a:off x="315672" y="1986732"/>
+            <a:ext cx="8188248" cy="4109268"/>
+          </a:xfrm>
+          <a:prstGeom prst="rect">
+            <a:avLst/>
+          </a:prstGeom>
+          <a:noFill/>
+          <a:ln>
+            <a:noFill/>
+          </a:ln>
+          <a:extLst>
+            <a:ext uri="{909E8E84-426E-40DD-AFC4-6F175D3DCCD1}">
+              <a14:hiddenFill xmlns:a14="http://schemas.microsoft.com/office/drawing/2010/main">
+                <a:solidFill>
+                  <a:schemeClr val="accent1"/>
+                </a:solidFill>
+              </a14:hiddenFill>
+            </a:ext>
+            <a:ext uri="{91240B29-F687-4F45-9708-019B960494DF}">
+              <a14:hiddenLine xmlns:a14="http://schemas.microsoft.com/office/drawing/2010/main" w="9525">
+                <a:solidFill>
+                  <a:schemeClr val="tx1"/>
+                </a:solidFill>
+                <a:miter lim="800000"/>
+                <a:headEnd/>
+                <a:tailEnd/>
+              </a14:hiddenLine>
+            </a:ext>
+          </a:extLst>
+        </p:spPr>
+      </p:pic>
+    </p:spTree>
+    <p:extLst>
+      <p:ext uri="{BB962C8B-B14F-4D97-AF65-F5344CB8AC3E}">
+        <p14:creationId xmlns:p14="http://schemas.microsoft.com/office/powerpoint/2010/main" val="792167143"/>
+      </p:ext>
+    </p:extLst>
+  </p:cSld>
+  <p:clrMapOvr>
+    <a:masterClrMapping/>
+  </p:clrMapOvr>
+  <p:timing>
+    <p:tnLst>
+      <p:par>
+        <p:cTn id="1" dur="indefinite" restart="never" nodeType="tmRoot"/>
+      </p:par>
+    </p:tnLst>
+  </p:timing>
 </p:sld>
 </file>
 
@@ -5233,14 +5912,16 @@
         </p:nvSpPr>
         <p:spPr/>
         <p:txBody>
-          <a:bodyPr/>
-          <a:lstStyle/>
-          <a:p>
-            <a:r>
-              <a:rPr lang="en-US" dirty="0" smtClean="0"/>
-              <a:t>System Architecture</a:t>
-            </a:r>
-            <a:endParaRPr lang="en-US" dirty="0"/>
+          <a:bodyPr>
+            <a:normAutofit/>
+          </a:bodyPr>
+          <a:lstStyle/>
+          <a:p>
+            <a:r>
+              <a:rPr lang="en-US" sz="3200" dirty="0" smtClean="0"/>
+              <a:t>What “we99” are Delivering – Plate Map Editor</a:t>
+            </a:r>
+            <a:endParaRPr lang="en-US" sz="3200" dirty="0"/>
           </a:p>
         </p:txBody>
       </p:sp>
@@ -5254,41 +5935,102 @@
             <p:ph idx="1"/>
           </p:nvPr>
         </p:nvSpPr>
-        <p:spPr/>
-        <p:txBody>
-          <a:bodyPr/>
-          <a:lstStyle/>
-          <a:p>
-            <a:r>
-              <a:rPr lang="en-US" dirty="0" smtClean="0"/>
-              <a:t>Insert Hardware Requirements</a:t>
-            </a:r>
-          </a:p>
-          <a:p>
-            <a:r>
-              <a:rPr lang="en-US" dirty="0" smtClean="0"/>
-              <a:t>Software Requirements / Databases</a:t>
-            </a:r>
-          </a:p>
-          <a:p>
-            <a:r>
-              <a:rPr lang="en-US" dirty="0" smtClean="0"/>
-              <a:t>Diagrams / Design Ideas</a:t>
-            </a:r>
-            <a:endParaRPr lang="en-US" dirty="0"/>
-          </a:p>
-        </p:txBody>
-      </p:sp>
+        <p:spPr>
+          <a:xfrm>
+            <a:off x="457200" y="1417320"/>
+            <a:ext cx="8229600" cy="4876800"/>
+          </a:xfrm>
+        </p:spPr>
+        <p:txBody>
+          <a:bodyPr/>
+          <a:lstStyle/>
+          <a:p>
+            <a:pPr marL="0" indent="0">
+              <a:buNone/>
+            </a:pPr>
+            <a:r>
+              <a:rPr lang="en-US" dirty="0" smtClean="0"/>
+              <a:t>Add Plate Wizar</a:t>
+            </a:r>
+            <a:r>
+              <a:rPr lang="en-US" dirty="0" smtClean="0"/>
+              <a:t>d – Part 2: Dosage</a:t>
+            </a:r>
+            <a:endParaRPr lang="en-US" dirty="0"/>
+          </a:p>
+        </p:txBody>
+      </p:sp>
+      <p:pic>
+        <p:nvPicPr>
+          <p:cNvPr id="3074" name="Picture 2"/>
+          <p:cNvPicPr>
+            <a:picLocks noChangeAspect="1" noChangeArrowheads="1"/>
+          </p:cNvPicPr>
+          <p:nvPr/>
+        </p:nvPicPr>
+        <p:blipFill>
+          <a:blip r:embed="rId2" cstate="email">
+            <a:extLst>
+              <a:ext uri="{28A0092B-C50C-407E-A947-70E740481C1C}">
+                <a14:useLocalDpi xmlns:a14="http://schemas.microsoft.com/office/drawing/2010/main" val="0"/>
+              </a:ext>
+            </a:extLst>
+          </a:blip>
+          <a:srcRect/>
+          <a:stretch>
+            <a:fillRect/>
+          </a:stretch>
+        </p:blipFill>
+        <p:spPr bwMode="auto">
+          <a:xfrm>
+            <a:off x="510540" y="2112621"/>
+            <a:ext cx="8073390" cy="4329454"/>
+          </a:xfrm>
+          <a:prstGeom prst="rect">
+            <a:avLst/>
+          </a:prstGeom>
+          <a:noFill/>
+          <a:ln>
+            <a:noFill/>
+          </a:ln>
+          <a:extLst>
+            <a:ext uri="{909E8E84-426E-40DD-AFC4-6F175D3DCCD1}">
+              <a14:hiddenFill xmlns:a14="http://schemas.microsoft.com/office/drawing/2010/main">
+                <a:solidFill>
+                  <a:schemeClr val="accent1"/>
+                </a:solidFill>
+              </a14:hiddenFill>
+            </a:ext>
+            <a:ext uri="{91240B29-F687-4F45-9708-019B960494DF}">
+              <a14:hiddenLine xmlns:a14="http://schemas.microsoft.com/office/drawing/2010/main" w="9525">
+                <a:solidFill>
+                  <a:schemeClr val="tx1"/>
+                </a:solidFill>
+                <a:miter lim="800000"/>
+                <a:headEnd/>
+                <a:tailEnd/>
+              </a14:hiddenLine>
+            </a:ext>
+          </a:extLst>
+        </p:spPr>
+      </p:pic>
     </p:spTree>
     <p:extLst>
       <p:ext uri="{BB962C8B-B14F-4D97-AF65-F5344CB8AC3E}">
-        <p14:creationId xmlns:p14="http://schemas.microsoft.com/office/powerpoint/2010/main" val="3412289552"/>
+        <p14:creationId xmlns:p14="http://schemas.microsoft.com/office/powerpoint/2010/main" val="3488533225"/>
       </p:ext>
     </p:extLst>
   </p:cSld>
   <p:clrMapOvr>
     <a:masterClrMapping/>
   </p:clrMapOvr>
+  <p:timing>
+    <p:tnLst>
+      <p:par>
+        <p:cTn id="1" dur="indefinite" restart="never" nodeType="tmRoot"/>
+      </p:par>
+    </p:tnLst>
+  </p:timing>
 </p:sld>
 </file>
 
@@ -5321,14 +6063,16 @@
         </p:nvSpPr>
         <p:spPr/>
         <p:txBody>
-          <a:bodyPr/>
-          <a:lstStyle/>
-          <a:p>
-            <a:r>
-              <a:rPr lang="en-US" dirty="0" smtClean="0"/>
-              <a:t>Web Services</a:t>
-            </a:r>
-            <a:endParaRPr lang="en-US" dirty="0"/>
+          <a:bodyPr>
+            <a:normAutofit/>
+          </a:bodyPr>
+          <a:lstStyle/>
+          <a:p>
+            <a:r>
+              <a:rPr lang="en-US" sz="3200" dirty="0" smtClean="0"/>
+              <a:t>What “we99” are Delivering – Plate Map Editor</a:t>
+            </a:r>
+            <a:endParaRPr lang="en-US" sz="3200" dirty="0"/>
           </a:p>
         </p:txBody>
       </p:sp>
@@ -5342,25 +6086,148 @@
             <p:ph idx="1"/>
           </p:nvPr>
         </p:nvSpPr>
-        <p:spPr/>
-        <p:txBody>
-          <a:bodyPr/>
-          <a:lstStyle/>
-          <a:p>
-            <a:endParaRPr lang="en-US" dirty="0"/>
+        <p:spPr>
+          <a:xfrm>
+            <a:off x="457200" y="1417320"/>
+            <a:ext cx="8229600" cy="4876800"/>
+          </a:xfrm>
+        </p:spPr>
+        <p:txBody>
+          <a:bodyPr/>
+          <a:lstStyle/>
+          <a:p>
+            <a:pPr marL="0" indent="0">
+              <a:buNone/>
+            </a:pPr>
+            <a:r>
+              <a:rPr lang="en-US" dirty="0" smtClean="0"/>
+              <a:t>Add Plate Wizar</a:t>
+            </a:r>
+            <a:r>
+              <a:rPr lang="en-US" dirty="0" smtClean="0"/>
+              <a:t>d – Plate Preview</a:t>
+            </a:r>
+            <a:endParaRPr lang="en-US" dirty="0"/>
+          </a:p>
+        </p:txBody>
+      </p:sp>
+      <p:pic>
+        <p:nvPicPr>
+          <p:cNvPr id="5122" name="Picture 2"/>
+          <p:cNvPicPr>
+            <a:picLocks noChangeAspect="1" noChangeArrowheads="1"/>
+          </p:cNvPicPr>
+          <p:nvPr/>
+        </p:nvPicPr>
+        <p:blipFill rotWithShape="1">
+          <a:blip r:embed="rId2">
+            <a:extLst>
+              <a:ext uri="{28A0092B-C50C-407E-A947-70E740481C1C}">
+                <a14:useLocalDpi xmlns:a14="http://schemas.microsoft.com/office/drawing/2010/main" val="0"/>
+              </a:ext>
+            </a:extLst>
+          </a:blip>
+          <a:srcRect t="1667" b="-1667"/>
+          <a:stretch/>
+        </p:blipFill>
+        <p:spPr bwMode="auto">
+          <a:xfrm>
+            <a:off x="556260" y="1859280"/>
+            <a:ext cx="7981950" cy="4572000"/>
+          </a:xfrm>
+          <a:prstGeom prst="rect">
+            <a:avLst/>
+          </a:prstGeom>
+          <a:noFill/>
+          <a:ln>
+            <a:noFill/>
+          </a:ln>
+          <a:extLst>
+            <a:ext uri="{909E8E84-426E-40DD-AFC4-6F175D3DCCD1}">
+              <a14:hiddenFill xmlns:a14="http://schemas.microsoft.com/office/drawing/2010/main">
+                <a:solidFill>
+                  <a:schemeClr val="accent1"/>
+                </a:solidFill>
+              </a14:hiddenFill>
+            </a:ext>
+            <a:ext uri="{91240B29-F687-4F45-9708-019B960494DF}">
+              <a14:hiddenLine xmlns:a14="http://schemas.microsoft.com/office/drawing/2010/main" w="9525">
+                <a:solidFill>
+                  <a:schemeClr val="tx1"/>
+                </a:solidFill>
+                <a:miter lim="800000"/>
+                <a:headEnd/>
+                <a:tailEnd/>
+              </a14:hiddenLine>
+            </a:ext>
+          </a:extLst>
+        </p:spPr>
+      </p:pic>
+      <p:sp>
+        <p:nvSpPr>
+          <p:cNvPr id="4" name="Rectangle 3"/>
+          <p:cNvSpPr/>
+          <p:nvPr/>
+        </p:nvSpPr>
+        <p:spPr>
+          <a:xfrm>
+            <a:off x="6560820" y="3985260"/>
+            <a:ext cx="1470660" cy="601980"/>
+          </a:xfrm>
+          <a:prstGeom prst="rect">
+            <a:avLst/>
+          </a:prstGeom>
+          <a:solidFill>
+            <a:schemeClr val="bg1"/>
+          </a:solidFill>
+          <a:ln>
+            <a:solidFill>
+              <a:schemeClr val="bg1"/>
+            </a:solidFill>
+          </a:ln>
+        </p:spPr>
+        <p:style>
+          <a:lnRef idx="2">
+            <a:schemeClr val="accent1">
+              <a:shade val="50000"/>
+            </a:schemeClr>
+          </a:lnRef>
+          <a:fillRef idx="1">
+            <a:schemeClr val="accent1"/>
+          </a:fillRef>
+          <a:effectRef idx="0">
+            <a:schemeClr val="accent1"/>
+          </a:effectRef>
+          <a:fontRef idx="minor">
+            <a:schemeClr val="lt1"/>
+          </a:fontRef>
+        </p:style>
+        <p:txBody>
+          <a:bodyPr rtlCol="0" anchor="ctr"/>
+          <a:lstStyle/>
+          <a:p>
+            <a:pPr algn="ctr"/>
+            <a:endParaRPr lang="en-US"/>
           </a:p>
         </p:txBody>
       </p:sp>
     </p:spTree>
     <p:extLst>
       <p:ext uri="{BB962C8B-B14F-4D97-AF65-F5344CB8AC3E}">
-        <p14:creationId xmlns:p14="http://schemas.microsoft.com/office/powerpoint/2010/main" val="2634932234"/>
+        <p14:creationId xmlns:p14="http://schemas.microsoft.com/office/powerpoint/2010/main" val="2365134927"/>
       </p:ext>
     </p:extLst>
   </p:cSld>
   <p:clrMapOvr>
     <a:masterClrMapping/>
   </p:clrMapOvr>
+  <p:timing>
+    <p:tnLst>
+      <p:par>
+        <p:cTn id="1" dur="indefinite" restart="never" nodeType="tmRoot"/>
+      </p:par>
+    </p:tnLst>
+  </p:timing>
 </p:sld>
 </file>
 

</xml_diff>